<commit_message>
commit before using modelsward template
</commit_message>
<xml_diff>
--- a/figures/casestudystatemachine.pptx
+++ b/figures/casestudystatemachine.pptx
@@ -104,6 +104,11 @@
       </a:defRPr>
     </a:lvl9pPr>
   </p:defaultTextStyle>
+  <p:extLst>
+    <p:ext uri="{EFAFB233-063F-42B5-8137-9DF3F51BA10A}">
+      <p15:sldGuideLst xmlns:p15="http://schemas.microsoft.com/office/powerpoint/2012/main"/>
+    </p:ext>
+  </p:extLst>
 </p:presentation>
 </file>
 
@@ -238,7 +243,7 @@
           <a:p>
             <a:fld id="{7DA78B80-5E2C-4D96-B313-872A2021DD9F}" type="datetimeFigureOut">
               <a:rPr lang="fr-FR" smtClean="0"/>
-              <a:t>11/09/2016</a:t>
+              <a:t>30/09/2016</a:t>
             </a:fld>
             <a:endParaRPr lang="fr-FR"/>
           </a:p>
@@ -408,7 +413,7 @@
           <a:p>
             <a:fld id="{7DA78B80-5E2C-4D96-B313-872A2021DD9F}" type="datetimeFigureOut">
               <a:rPr lang="fr-FR" smtClean="0"/>
-              <a:t>11/09/2016</a:t>
+              <a:t>30/09/2016</a:t>
             </a:fld>
             <a:endParaRPr lang="fr-FR"/>
           </a:p>
@@ -588,7 +593,7 @@
           <a:p>
             <a:fld id="{7DA78B80-5E2C-4D96-B313-872A2021DD9F}" type="datetimeFigureOut">
               <a:rPr lang="fr-FR" smtClean="0"/>
-              <a:t>11/09/2016</a:t>
+              <a:t>30/09/2016</a:t>
             </a:fld>
             <a:endParaRPr lang="fr-FR"/>
           </a:p>
@@ -758,7 +763,7 @@
           <a:p>
             <a:fld id="{7DA78B80-5E2C-4D96-B313-872A2021DD9F}" type="datetimeFigureOut">
               <a:rPr lang="fr-FR" smtClean="0"/>
-              <a:t>11/09/2016</a:t>
+              <a:t>30/09/2016</a:t>
             </a:fld>
             <a:endParaRPr lang="fr-FR"/>
           </a:p>
@@ -1004,7 +1009,7 @@
           <a:p>
             <a:fld id="{7DA78B80-5E2C-4D96-B313-872A2021DD9F}" type="datetimeFigureOut">
               <a:rPr lang="fr-FR" smtClean="0"/>
-              <a:t>11/09/2016</a:t>
+              <a:t>30/09/2016</a:t>
             </a:fld>
             <a:endParaRPr lang="fr-FR"/>
           </a:p>
@@ -1236,7 +1241,7 @@
           <a:p>
             <a:fld id="{7DA78B80-5E2C-4D96-B313-872A2021DD9F}" type="datetimeFigureOut">
               <a:rPr lang="fr-FR" smtClean="0"/>
-              <a:t>11/09/2016</a:t>
+              <a:t>30/09/2016</a:t>
             </a:fld>
             <a:endParaRPr lang="fr-FR"/>
           </a:p>
@@ -1603,7 +1608,7 @@
           <a:p>
             <a:fld id="{7DA78B80-5E2C-4D96-B313-872A2021DD9F}" type="datetimeFigureOut">
               <a:rPr lang="fr-FR" smtClean="0"/>
-              <a:t>11/09/2016</a:t>
+              <a:t>30/09/2016</a:t>
             </a:fld>
             <a:endParaRPr lang="fr-FR"/>
           </a:p>
@@ -1721,7 +1726,7 @@
           <a:p>
             <a:fld id="{7DA78B80-5E2C-4D96-B313-872A2021DD9F}" type="datetimeFigureOut">
               <a:rPr lang="fr-FR" smtClean="0"/>
-              <a:t>11/09/2016</a:t>
+              <a:t>30/09/2016</a:t>
             </a:fld>
             <a:endParaRPr lang="fr-FR"/>
           </a:p>
@@ -1816,7 +1821,7 @@
           <a:p>
             <a:fld id="{7DA78B80-5E2C-4D96-B313-872A2021DD9F}" type="datetimeFigureOut">
               <a:rPr lang="fr-FR" smtClean="0"/>
-              <a:t>11/09/2016</a:t>
+              <a:t>30/09/2016</a:t>
             </a:fld>
             <a:endParaRPr lang="fr-FR"/>
           </a:p>
@@ -2093,7 +2098,7 @@
           <a:p>
             <a:fld id="{7DA78B80-5E2C-4D96-B313-872A2021DD9F}" type="datetimeFigureOut">
               <a:rPr lang="fr-FR" smtClean="0"/>
-              <a:t>11/09/2016</a:t>
+              <a:t>30/09/2016</a:t>
             </a:fld>
             <a:endParaRPr lang="fr-FR"/>
           </a:p>
@@ -2346,7 +2351,7 @@
           <a:p>
             <a:fld id="{7DA78B80-5E2C-4D96-B313-872A2021DD9F}" type="datetimeFigureOut">
               <a:rPr lang="fr-FR" smtClean="0"/>
-              <a:t>11/09/2016</a:t>
+              <a:t>30/09/2016</a:t>
             </a:fld>
             <a:endParaRPr lang="fr-FR"/>
           </a:p>
@@ -2559,7 +2564,7 @@
           <a:p>
             <a:fld id="{7DA78B80-5E2C-4D96-B313-872A2021DD9F}" type="datetimeFigureOut">
               <a:rPr lang="fr-FR" smtClean="0"/>
-              <a:t>11/09/2016</a:t>
+              <a:t>30/09/2016</a:t>
             </a:fld>
             <a:endParaRPr lang="fr-FR"/>
           </a:p>
@@ -3028,7 +3033,7 @@
             </a:bodyPr>
             <a:lstStyle/>
             <a:p>
-              <a:endParaRPr lang="fr-FR"/>
+              <a:endParaRPr lang="fr-FR" sz="1400"/>
             </a:p>
           </p:txBody>
         </p:sp>
@@ -3075,7 +3080,7 @@
             </a:bodyPr>
             <a:lstStyle/>
             <a:p>
-              <a:endParaRPr lang="fr-FR"/>
+              <a:endParaRPr lang="fr-FR" sz="1400"/>
             </a:p>
           </p:txBody>
         </p:sp>
@@ -3089,8 +3094,8 @@
           </p:nvSpPr>
           <p:spPr bwMode="auto">
             <a:xfrm>
-              <a:off x="1056" y="83"/>
-              <a:ext cx="931" cy="114"/>
+              <a:off x="1040" y="75"/>
+              <a:ext cx="1187" cy="136"/>
             </a:xfrm>
             <a:prstGeom prst="rect">
               <a:avLst/>
@@ -3272,7 +3277,7 @@
                 <a:tabLst/>
               </a:pPr>
               <a:r>
-                <a:rPr kumimoji="0" lang="fr-FR" altLang="fr-FR" sz="1000" b="0" i="0" u="none" strike="noStrike" cap="none" normalizeH="0" baseline="0" smtClean="0">
+                <a:rPr kumimoji="0" lang="fr-FR" altLang="fr-FR" sz="1400" b="0" i="0" u="none" strike="noStrike" cap="none" normalizeH="0" baseline="0" smtClean="0">
                   <a:ln>
                     <a:noFill/>
                   </a:ln>
@@ -3280,11 +3285,11 @@
                     <a:srgbClr val="000000"/>
                   </a:solidFill>
                   <a:effectLst/>
-                  <a:latin typeface="Tahoma" panose="020B0604030504040204" pitchFamily="34" charset="0"/>
+                  <a:latin typeface="+mn-lt"/>
                 </a:rPr>
                 <a:t>IntersectionStateMachine</a:t>
               </a:r>
-              <a:endParaRPr kumimoji="0" lang="fr-FR" altLang="fr-FR" sz="1800" b="0" i="0" u="none" strike="noStrike" cap="none" normalizeH="0" baseline="0" smtClean="0">
+              <a:endParaRPr kumimoji="0" lang="fr-FR" altLang="fr-FR" sz="1400" b="0" i="0" u="none" strike="noStrike" cap="none" normalizeH="0" baseline="0" smtClean="0">
                 <a:ln>
                   <a:noFill/>
                 </a:ln>
@@ -3292,7 +3297,7 @@
                   <a:schemeClr val="tx1"/>
                 </a:solidFill>
                 <a:effectLst/>
-                <a:latin typeface="Arial" panose="020B0604020202020204" pitchFamily="34" charset="0"/>
+                <a:latin typeface="+mn-lt"/>
               </a:endParaRPr>
             </a:p>
           </p:txBody>
@@ -3340,7 +3345,7 @@
             </a:bodyPr>
             <a:lstStyle/>
             <a:p>
-              <a:endParaRPr lang="fr-FR"/>
+              <a:endParaRPr lang="fr-FR" sz="1400"/>
             </a:p>
           </p:txBody>
         </p:sp>
@@ -3387,7 +3392,7 @@
             </a:bodyPr>
             <a:lstStyle/>
             <a:p>
-              <a:endParaRPr lang="fr-FR"/>
+              <a:endParaRPr lang="fr-FR" sz="1400"/>
             </a:p>
           </p:txBody>
         </p:sp>
@@ -3401,8 +3406,8 @@
           </p:nvSpPr>
           <p:spPr bwMode="auto">
             <a:xfrm>
-              <a:off x="557" y="289"/>
-              <a:ext cx="543" cy="126"/>
+              <a:off x="493" y="281"/>
+              <a:ext cx="643" cy="136"/>
             </a:xfrm>
             <a:prstGeom prst="rect">
               <a:avLst/>
@@ -3584,7 +3589,7 @@
                 <a:tabLst/>
               </a:pPr>
               <a:r>
-                <a:rPr kumimoji="0" lang="fr-FR" altLang="fr-FR" sz="1000" b="0" i="0" u="none" strike="noStrike" cap="none" normalizeH="0" baseline="0" smtClean="0">
+                <a:rPr kumimoji="0" lang="fr-FR" altLang="fr-FR" sz="1400" b="0" i="0" u="none" strike="noStrike" cap="none" normalizeH="0" baseline="0" smtClean="0">
                   <a:ln>
                     <a:noFill/>
                   </a:ln>
@@ -3592,11 +3597,11 @@
                     <a:srgbClr val="000000"/>
                   </a:solidFill>
                   <a:effectLst/>
-                  <a:latin typeface="Segoe UI" panose="020B0502040204020203" pitchFamily="34" charset="0"/>
+                  <a:latin typeface="+mn-lt"/>
                 </a:rPr>
                 <a:t>HighwayOpen</a:t>
               </a:r>
-              <a:endParaRPr kumimoji="0" lang="fr-FR" altLang="fr-FR" sz="1800" b="0" i="0" u="none" strike="noStrike" cap="none" normalizeH="0" baseline="0" smtClean="0">
+              <a:endParaRPr kumimoji="0" lang="fr-FR" altLang="fr-FR" sz="1400" b="0" i="0" u="none" strike="noStrike" cap="none" normalizeH="0" baseline="0" smtClean="0">
                 <a:ln>
                   <a:noFill/>
                 </a:ln>
@@ -3604,7 +3609,7 @@
                   <a:schemeClr val="tx1"/>
                 </a:solidFill>
                 <a:effectLst/>
-                <a:latin typeface="Arial" panose="020B0604020202020204" pitchFamily="34" charset="0"/>
+                <a:latin typeface="+mn-lt"/>
               </a:endParaRPr>
             </a:p>
           </p:txBody>
@@ -3652,7 +3657,7 @@
             </a:bodyPr>
             <a:lstStyle/>
             <a:p>
-              <a:endParaRPr lang="fr-FR"/>
+              <a:endParaRPr lang="fr-FR" sz="1400"/>
             </a:p>
           </p:txBody>
         </p:sp>
@@ -3698,7 +3703,7 @@
             </a:bodyPr>
             <a:lstStyle/>
             <a:p>
-              <a:endParaRPr lang="fr-FR"/>
+              <a:endParaRPr lang="fr-FR" sz="1400"/>
             </a:p>
           </p:txBody>
         </p:sp>
@@ -3837,7 +3842,7 @@
             </a:bodyPr>
             <a:lstStyle/>
             <a:p>
-              <a:endParaRPr lang="fr-FR"/>
+              <a:endParaRPr lang="fr-FR" sz="1400"/>
             </a:p>
           </p:txBody>
         </p:sp>
@@ -3884,7 +3889,7 @@
             </a:bodyPr>
             <a:lstStyle/>
             <a:p>
-              <a:endParaRPr lang="fr-FR"/>
+              <a:endParaRPr lang="fr-FR" sz="1400"/>
             </a:p>
           </p:txBody>
         </p:sp>
@@ -3898,8 +3903,8 @@
           </p:nvSpPr>
           <p:spPr bwMode="auto">
             <a:xfrm>
-              <a:off x="1638" y="270"/>
-              <a:ext cx="1118" cy="126"/>
+              <a:off x="1524" y="262"/>
+              <a:ext cx="1382" cy="136"/>
             </a:xfrm>
             <a:prstGeom prst="rect">
               <a:avLst/>
@@ -4081,7 +4086,7 @@
                 <a:tabLst/>
               </a:pPr>
               <a:r>
-                <a:rPr kumimoji="0" lang="fr-FR" altLang="fr-FR" sz="1000" b="0" i="0" u="none" strike="noStrike" cap="none" normalizeH="0" baseline="0" smtClean="0">
+                <a:rPr kumimoji="0" lang="fr-FR" altLang="fr-FR" sz="1400" b="0" i="0" u="none" strike="noStrike" cap="none" normalizeH="0" baseline="0" smtClean="0">
                   <a:ln>
                     <a:noFill/>
                   </a:ln>
@@ -4089,11 +4094,11 @@
                     <a:srgbClr val="000000"/>
                   </a:solidFill>
                   <a:effectLst/>
-                  <a:latin typeface="Segoe UI" panose="020B0502040204020203" pitchFamily="34" charset="0"/>
+                  <a:latin typeface="+mn-lt"/>
                 </a:rPr>
                 <a:t>SwitchingHighwayToFarmroad</a:t>
               </a:r>
-              <a:endParaRPr kumimoji="0" lang="fr-FR" altLang="fr-FR" sz="1800" b="0" i="0" u="none" strike="noStrike" cap="none" normalizeH="0" baseline="0" smtClean="0">
+              <a:endParaRPr kumimoji="0" lang="fr-FR" altLang="fr-FR" sz="1400" b="0" i="0" u="none" strike="noStrike" cap="none" normalizeH="0" baseline="0" smtClean="0">
                 <a:ln>
                   <a:noFill/>
                 </a:ln>
@@ -4101,7 +4106,7 @@
                   <a:schemeClr val="tx1"/>
                 </a:solidFill>
                 <a:effectLst/>
-                <a:latin typeface="Arial" panose="020B0604020202020204" pitchFamily="34" charset="0"/>
+                <a:latin typeface="+mn-lt"/>
               </a:endParaRPr>
             </a:p>
           </p:txBody>
@@ -4149,7 +4154,7 @@
             </a:bodyPr>
             <a:lstStyle/>
             <a:p>
-              <a:endParaRPr lang="fr-FR"/>
+              <a:endParaRPr lang="fr-FR" sz="1400"/>
             </a:p>
           </p:txBody>
         </p:sp>
@@ -4195,7 +4200,7 @@
             </a:bodyPr>
             <a:lstStyle/>
             <a:p>
-              <a:endParaRPr lang="fr-FR"/>
+              <a:endParaRPr lang="fr-FR" sz="1400"/>
             </a:p>
           </p:txBody>
         </p:sp>
@@ -4334,7 +4339,7 @@
             </a:bodyPr>
             <a:lstStyle/>
             <a:p>
-              <a:endParaRPr lang="fr-FR"/>
+              <a:endParaRPr lang="fr-FR" sz="1400"/>
             </a:p>
           </p:txBody>
         </p:sp>
@@ -4381,7 +4386,7 @@
             </a:bodyPr>
             <a:lstStyle/>
             <a:p>
-              <a:endParaRPr lang="fr-FR"/>
+              <a:endParaRPr lang="fr-FR" sz="1400"/>
             </a:p>
           </p:txBody>
         </p:sp>
@@ -4395,8 +4400,8 @@
           </p:nvSpPr>
           <p:spPr bwMode="auto">
             <a:xfrm>
-              <a:off x="250" y="827"/>
-              <a:ext cx="1118" cy="126"/>
+              <a:off x="68" y="827"/>
+              <a:ext cx="1382" cy="136"/>
             </a:xfrm>
             <a:prstGeom prst="rect">
               <a:avLst/>
@@ -4578,7 +4583,7 @@
                 <a:tabLst/>
               </a:pPr>
               <a:r>
-                <a:rPr kumimoji="0" lang="fr-FR" altLang="fr-FR" sz="1000" b="0" i="0" u="none" strike="noStrike" cap="none" normalizeH="0" baseline="0" smtClean="0">
+                <a:rPr kumimoji="0" lang="fr-FR" altLang="fr-FR" sz="1400" b="0" i="0" u="none" strike="noStrike" cap="none" normalizeH="0" baseline="0" smtClean="0">
                   <a:ln>
                     <a:noFill/>
                   </a:ln>
@@ -4586,11 +4591,11 @@
                     <a:srgbClr val="000000"/>
                   </a:solidFill>
                   <a:effectLst/>
-                  <a:latin typeface="Segoe UI" panose="020B0502040204020203" pitchFamily="34" charset="0"/>
+                  <a:latin typeface="+mn-lt"/>
                 </a:rPr>
                 <a:t>SwitchingFarmroadToHighway</a:t>
               </a:r>
-              <a:endParaRPr kumimoji="0" lang="fr-FR" altLang="fr-FR" sz="1800" b="0" i="0" u="none" strike="noStrike" cap="none" normalizeH="0" baseline="0" smtClean="0">
+              <a:endParaRPr kumimoji="0" lang="fr-FR" altLang="fr-FR" sz="1400" b="0" i="0" u="none" strike="noStrike" cap="none" normalizeH="0" baseline="0" smtClean="0">
                 <a:ln>
                   <a:noFill/>
                 </a:ln>
@@ -4598,7 +4603,7 @@
                   <a:schemeClr val="tx1"/>
                 </a:solidFill>
                 <a:effectLst/>
-                <a:latin typeface="Arial" panose="020B0604020202020204" pitchFamily="34" charset="0"/>
+                <a:latin typeface="+mn-lt"/>
               </a:endParaRPr>
             </a:p>
           </p:txBody>
@@ -4646,7 +4651,7 @@
             </a:bodyPr>
             <a:lstStyle/>
             <a:p>
-              <a:endParaRPr lang="fr-FR"/>
+              <a:endParaRPr lang="fr-FR" sz="1400"/>
             </a:p>
           </p:txBody>
         </p:sp>
@@ -4692,7 +4697,7 @@
             </a:bodyPr>
             <a:lstStyle/>
             <a:p>
-              <a:endParaRPr lang="fr-FR"/>
+              <a:endParaRPr lang="fr-FR" sz="1400"/>
             </a:p>
           </p:txBody>
         </p:sp>
@@ -4706,8 +4711,8 @@
           </p:nvSpPr>
           <p:spPr bwMode="auto">
             <a:xfrm>
-              <a:off x="134" y="807"/>
-              <a:ext cx="1268" cy="326"/>
+              <a:off x="89" y="807"/>
+              <a:ext cx="1313" cy="326"/>
             </a:xfrm>
             <a:custGeom>
               <a:avLst/>
@@ -4831,7 +4836,7 @@
             </a:bodyPr>
             <a:lstStyle/>
             <a:p>
-              <a:endParaRPr lang="fr-FR"/>
+              <a:endParaRPr lang="fr-FR" sz="1400"/>
             </a:p>
           </p:txBody>
         </p:sp>
@@ -4846,7 +4851,7 @@
           <p:spPr bwMode="auto">
             <a:xfrm>
               <a:off x="2137" y="832"/>
-              <a:ext cx="506" cy="282"/>
+              <a:ext cx="660" cy="282"/>
             </a:xfrm>
             <a:prstGeom prst="rect">
               <a:avLst/>
@@ -4878,7 +4883,7 @@
             </a:bodyPr>
             <a:lstStyle/>
             <a:p>
-              <a:endParaRPr lang="fr-FR"/>
+              <a:endParaRPr lang="fr-FR" sz="1400"/>
             </a:p>
           </p:txBody>
         </p:sp>
@@ -4893,7 +4898,7 @@
           <p:spPr bwMode="auto">
             <a:xfrm>
               <a:off x="2150" y="853"/>
-              <a:ext cx="552" cy="126"/>
+              <a:ext cx="665" cy="136"/>
             </a:xfrm>
             <a:prstGeom prst="rect">
               <a:avLst/>
@@ -5075,7 +5080,7 @@
                 <a:tabLst/>
               </a:pPr>
               <a:r>
-                <a:rPr kumimoji="0" lang="fr-FR" altLang="fr-FR" sz="1000" b="0" i="0" u="none" strike="noStrike" cap="none" normalizeH="0" baseline="0" smtClean="0">
+                <a:rPr kumimoji="0" lang="fr-FR" altLang="fr-FR" sz="1400" b="0" i="0" u="none" strike="noStrike" cap="none" normalizeH="0" baseline="0" smtClean="0">
                   <a:ln>
                     <a:noFill/>
                   </a:ln>
@@ -5083,11 +5088,11 @@
                     <a:srgbClr val="000000"/>
                   </a:solidFill>
                   <a:effectLst/>
-                  <a:latin typeface="Segoe UI" panose="020B0502040204020203" pitchFamily="34" charset="0"/>
+                  <a:latin typeface="+mn-lt"/>
                 </a:rPr>
                 <a:t>FarmwayOpen</a:t>
               </a:r>
-              <a:endParaRPr kumimoji="0" lang="fr-FR" altLang="fr-FR" sz="1800" b="0" i="0" u="none" strike="noStrike" cap="none" normalizeH="0" baseline="0" smtClean="0">
+              <a:endParaRPr kumimoji="0" lang="fr-FR" altLang="fr-FR" sz="1400" b="0" i="0" u="none" strike="noStrike" cap="none" normalizeH="0" baseline="0" smtClean="0">
                 <a:ln>
                   <a:noFill/>
                 </a:ln>
@@ -5095,7 +5100,7 @@
                   <a:schemeClr val="tx1"/>
                 </a:solidFill>
                 <a:effectLst/>
-                <a:latin typeface="Arial" panose="020B0604020202020204" pitchFamily="34" charset="0"/>
+                <a:latin typeface="+mn-lt"/>
               </a:endParaRPr>
             </a:p>
           </p:txBody>
@@ -5111,7 +5116,7 @@
           <p:spPr bwMode="auto">
             <a:xfrm>
               <a:off x="2137" y="832"/>
-              <a:ext cx="500" cy="276"/>
+              <a:ext cx="701" cy="276"/>
             </a:xfrm>
             <a:custGeom>
               <a:avLst/>
@@ -5235,7 +5240,7 @@
             </a:bodyPr>
             <a:lstStyle/>
             <a:p>
-              <a:endParaRPr lang="fr-FR"/>
+              <a:endParaRPr lang="fr-FR" sz="1400"/>
             </a:p>
           </p:txBody>
         </p:sp>
@@ -5249,8 +5254,8 @@
           </p:nvSpPr>
           <p:spPr bwMode="auto">
             <a:xfrm>
-              <a:off x="154" y="238"/>
-              <a:ext cx="299" cy="126"/>
+              <a:off x="116" y="275"/>
+              <a:ext cx="342" cy="136"/>
             </a:xfrm>
             <a:prstGeom prst="rect">
               <a:avLst/>
@@ -5432,7 +5437,7 @@
                 <a:tabLst/>
               </a:pPr>
               <a:r>
-                <a:rPr kumimoji="0" lang="fr-FR" altLang="fr-FR" sz="1000" b="0" i="0" u="none" strike="noStrike" cap="none" normalizeH="0" baseline="0" smtClean="0">
+                <a:rPr kumimoji="0" lang="fr-FR" altLang="fr-FR" sz="1400" b="0" i="0" u="none" strike="noStrike" cap="none" normalizeH="0" baseline="0" smtClean="0">
                   <a:ln>
                     <a:noFill/>
                   </a:ln>
@@ -5440,11 +5445,11 @@
                     <a:srgbClr val="000000"/>
                   </a:solidFill>
                   <a:effectLst/>
-                  <a:latin typeface="Segoe UI" panose="020B0502040204020203" pitchFamily="34" charset="0"/>
+                  <a:latin typeface="+mn-lt"/>
                 </a:rPr>
                 <a:t> Initial1</a:t>
               </a:r>
-              <a:endParaRPr kumimoji="0" lang="fr-FR" altLang="fr-FR" sz="1800" b="0" i="0" u="none" strike="noStrike" cap="none" normalizeH="0" baseline="0" smtClean="0">
+              <a:endParaRPr kumimoji="0" lang="fr-FR" altLang="fr-FR" sz="1400" b="0" i="0" u="none" strike="noStrike" cap="none" normalizeH="0" baseline="0" smtClean="0">
                 <a:ln>
                   <a:noFill/>
                 </a:ln>
@@ -5452,7 +5457,7 @@
                   <a:schemeClr val="tx1"/>
                 </a:solidFill>
                 <a:effectLst/>
-                <a:latin typeface="Arial" panose="020B0604020202020204" pitchFamily="34" charset="0"/>
+                <a:latin typeface="+mn-lt"/>
               </a:endParaRPr>
             </a:p>
           </p:txBody>
@@ -5499,7 +5504,7 @@
             </a:bodyPr>
             <a:lstStyle/>
             <a:p>
-              <a:endParaRPr lang="fr-FR"/>
+              <a:endParaRPr lang="fr-FR" sz="1400"/>
             </a:p>
           </p:txBody>
         </p:sp>
@@ -5613,7 +5618,7 @@
             <a:noFill/>
             <a:ln w="11113" cap="flat">
               <a:solidFill>
-                <a:srgbClr val="B0B0B0"/>
+                <a:schemeClr val="tx1"/>
               </a:solidFill>
               <a:prstDash val="solid"/>
               <a:miter lim="800000"/>
@@ -5638,7 +5643,7 @@
             </a:bodyPr>
             <a:lstStyle/>
             <a:p>
-              <a:endParaRPr lang="fr-FR"/>
+              <a:endParaRPr lang="fr-FR" sz="1400"/>
             </a:p>
           </p:txBody>
         </p:sp>
@@ -5684,7 +5689,7 @@
             </a:bodyPr>
             <a:lstStyle/>
             <a:p>
-              <a:endParaRPr lang="fr-FR"/>
+              <a:endParaRPr lang="fr-FR" sz="1400"/>
             </a:p>
           </p:txBody>
         </p:sp>
@@ -5699,7 +5704,7 @@
           <p:spPr bwMode="auto">
             <a:xfrm>
               <a:off x="352" y="411"/>
-              <a:ext cx="65" cy="126"/>
+              <a:ext cx="25" cy="136"/>
             </a:xfrm>
             <a:prstGeom prst="rect">
               <a:avLst/>
@@ -5881,7 +5886,7 @@
                 <a:tabLst/>
               </a:pPr>
               <a:r>
-                <a:rPr kumimoji="0" lang="fr-FR" altLang="fr-FR" sz="1000" b="0" i="0" u="none" strike="noStrike" cap="none" normalizeH="0" baseline="0" smtClean="0">
+                <a:rPr kumimoji="0" lang="fr-FR" altLang="fr-FR" sz="1400" b="0" i="0" u="none" strike="noStrike" cap="none" normalizeH="0" baseline="0" smtClean="0">
                   <a:ln>
                     <a:noFill/>
                   </a:ln>
@@ -5889,11 +5894,11 @@
                     <a:srgbClr val="000000"/>
                   </a:solidFill>
                   <a:effectLst/>
-                  <a:latin typeface="Segoe UI" panose="020B0502040204020203" pitchFamily="34" charset="0"/>
+                  <a:latin typeface="+mn-lt"/>
                 </a:rPr>
                 <a:t> </a:t>
               </a:r>
-              <a:endParaRPr kumimoji="0" lang="fr-FR" altLang="fr-FR" sz="1800" b="0" i="0" u="none" strike="noStrike" cap="none" normalizeH="0" baseline="0" smtClean="0">
+              <a:endParaRPr kumimoji="0" lang="fr-FR" altLang="fr-FR" sz="1400" b="0" i="0" u="none" strike="noStrike" cap="none" normalizeH="0" baseline="0" smtClean="0">
                 <a:ln>
                   <a:noFill/>
                 </a:ln>
@@ -5901,7 +5906,7 @@
                   <a:schemeClr val="tx1"/>
                 </a:solidFill>
                 <a:effectLst/>
-                <a:latin typeface="Arial" panose="020B0604020202020204" pitchFamily="34" charset="0"/>
+                <a:latin typeface="+mn-lt"/>
               </a:endParaRPr>
             </a:p>
           </p:txBody>
@@ -5948,7 +5953,7 @@
             </a:bodyPr>
             <a:lstStyle/>
             <a:p>
-              <a:endParaRPr lang="fr-FR"/>
+              <a:endParaRPr lang="fr-FR" sz="1400"/>
             </a:p>
           </p:txBody>
         </p:sp>
@@ -5994,7 +5999,7 @@
             </a:bodyPr>
             <a:lstStyle/>
             <a:p>
-              <a:endParaRPr lang="fr-FR"/>
+              <a:endParaRPr lang="fr-FR" sz="1400"/>
             </a:p>
           </p:txBody>
         </p:sp>
@@ -6040,7 +6045,7 @@
             </a:bodyPr>
             <a:lstStyle/>
             <a:p>
-              <a:endParaRPr lang="fr-FR"/>
+              <a:endParaRPr lang="fr-FR" sz="1400"/>
             </a:p>
           </p:txBody>
         </p:sp>
@@ -6055,7 +6060,7 @@
           <p:spPr bwMode="auto">
             <a:xfrm>
               <a:off x="2394" y="673"/>
-              <a:ext cx="65" cy="126"/>
+              <a:ext cx="25" cy="136"/>
             </a:xfrm>
             <a:prstGeom prst="rect">
               <a:avLst/>
@@ -6237,7 +6242,7 @@
                 <a:tabLst/>
               </a:pPr>
               <a:r>
-                <a:rPr kumimoji="0" lang="fr-FR" altLang="fr-FR" sz="1000" b="0" i="0" u="none" strike="noStrike" cap="none" normalizeH="0" baseline="0" smtClean="0">
+                <a:rPr kumimoji="0" lang="fr-FR" altLang="fr-FR" sz="1400" b="0" i="0" u="none" strike="noStrike" cap="none" normalizeH="0" baseline="0" smtClean="0">
                   <a:ln>
                     <a:noFill/>
                   </a:ln>
@@ -6245,11 +6250,11 @@
                     <a:srgbClr val="000000"/>
                   </a:solidFill>
                   <a:effectLst/>
-                  <a:latin typeface="Segoe UI" panose="020B0502040204020203" pitchFamily="34" charset="0"/>
+                  <a:latin typeface="+mn-lt"/>
                 </a:rPr>
                 <a:t> </a:t>
               </a:r>
-              <a:endParaRPr kumimoji="0" lang="fr-FR" altLang="fr-FR" sz="1800" b="0" i="0" u="none" strike="noStrike" cap="none" normalizeH="0" baseline="0" smtClean="0">
+              <a:endParaRPr kumimoji="0" lang="fr-FR" altLang="fr-FR" sz="1400" b="0" i="0" u="none" strike="noStrike" cap="none" normalizeH="0" baseline="0" smtClean="0">
                 <a:ln>
                   <a:noFill/>
                 </a:ln>
@@ -6257,7 +6262,7 @@
                   <a:schemeClr val="tx1"/>
                 </a:solidFill>
                 <a:effectLst/>
-                <a:latin typeface="Arial" panose="020B0604020202020204" pitchFamily="34" charset="0"/>
+                <a:latin typeface="+mn-lt"/>
               </a:endParaRPr>
             </a:p>
           </p:txBody>
@@ -6304,7 +6309,7 @@
             </a:bodyPr>
             <a:lstStyle/>
             <a:p>
-              <a:endParaRPr lang="fr-FR"/>
+              <a:endParaRPr lang="fr-FR" sz="1400"/>
             </a:p>
           </p:txBody>
         </p:sp>
@@ -6350,7 +6355,7 @@
             </a:bodyPr>
             <a:lstStyle/>
             <a:p>
-              <a:endParaRPr lang="fr-FR"/>
+              <a:endParaRPr lang="fr-FR" sz="1400"/>
             </a:p>
           </p:txBody>
         </p:sp>
@@ -6396,7 +6401,7 @@
             </a:bodyPr>
             <a:lstStyle/>
             <a:p>
-              <a:endParaRPr lang="fr-FR"/>
+              <a:endParaRPr lang="fr-FR" sz="1400"/>
             </a:p>
           </p:txBody>
         </p:sp>
@@ -6411,7 +6416,7 @@
           <p:spPr bwMode="auto">
             <a:xfrm>
               <a:off x="762" y="661"/>
-              <a:ext cx="65" cy="126"/>
+              <a:ext cx="25" cy="136"/>
             </a:xfrm>
             <a:prstGeom prst="rect">
               <a:avLst/>
@@ -6593,7 +6598,7 @@
                 <a:tabLst/>
               </a:pPr>
               <a:r>
-                <a:rPr kumimoji="0" lang="fr-FR" altLang="fr-FR" sz="1000" b="0" i="0" u="none" strike="noStrike" cap="none" normalizeH="0" baseline="0" smtClean="0">
+                <a:rPr kumimoji="0" lang="fr-FR" altLang="fr-FR" sz="1400" b="0" i="0" u="none" strike="noStrike" cap="none" normalizeH="0" baseline="0" smtClean="0">
                   <a:ln>
                     <a:noFill/>
                   </a:ln>
@@ -6601,11 +6606,11 @@
                     <a:srgbClr val="000000"/>
                   </a:solidFill>
                   <a:effectLst/>
-                  <a:latin typeface="Segoe UI" panose="020B0502040204020203" pitchFamily="34" charset="0"/>
+                  <a:latin typeface="+mn-lt"/>
                 </a:rPr>
                 <a:t> </a:t>
               </a:r>
-              <a:endParaRPr kumimoji="0" lang="fr-FR" altLang="fr-FR" sz="1800" b="0" i="0" u="none" strike="noStrike" cap="none" normalizeH="0" baseline="0" smtClean="0">
+              <a:endParaRPr kumimoji="0" lang="fr-FR" altLang="fr-FR" sz="1400" b="0" i="0" u="none" strike="noStrike" cap="none" normalizeH="0" baseline="0" smtClean="0">
                 <a:ln>
                   <a:noFill/>
                 </a:ln>
@@ -6613,7 +6618,7 @@
                   <a:schemeClr val="tx1"/>
                 </a:solidFill>
                 <a:effectLst/>
-                <a:latin typeface="Arial" panose="020B0604020202020204" pitchFamily="34" charset="0"/>
+                <a:latin typeface="+mn-lt"/>
               </a:endParaRPr>
             </a:p>
           </p:txBody>
@@ -6660,7 +6665,7 @@
             </a:bodyPr>
             <a:lstStyle/>
             <a:p>
-              <a:endParaRPr lang="fr-FR"/>
+              <a:endParaRPr lang="fr-FR" sz="1400"/>
             </a:p>
           </p:txBody>
         </p:sp>
@@ -6706,7 +6711,7 @@
             </a:bodyPr>
             <a:lstStyle/>
             <a:p>
-              <a:endParaRPr lang="fr-FR"/>
+              <a:endParaRPr lang="fr-FR" sz="1400"/>
             </a:p>
           </p:txBody>
         </p:sp>
@@ -6752,7 +6757,7 @@
             </a:bodyPr>
             <a:lstStyle/>
             <a:p>
-              <a:endParaRPr lang="fr-FR"/>
+              <a:endParaRPr lang="fr-FR" sz="1400"/>
             </a:p>
           </p:txBody>
         </p:sp>
@@ -6767,7 +6772,7 @@
           <p:spPr bwMode="auto">
             <a:xfrm>
               <a:off x="1331" y="379"/>
-              <a:ext cx="65" cy="126"/>
+              <a:ext cx="25" cy="136"/>
             </a:xfrm>
             <a:prstGeom prst="rect">
               <a:avLst/>
@@ -6949,7 +6954,7 @@
                 <a:tabLst/>
               </a:pPr>
               <a:r>
-                <a:rPr kumimoji="0" lang="fr-FR" altLang="fr-FR" sz="1000" b="0" i="0" u="none" strike="noStrike" cap="none" normalizeH="0" baseline="0" smtClean="0">
+                <a:rPr kumimoji="0" lang="fr-FR" altLang="fr-FR" sz="1400" b="0" i="0" u="none" strike="noStrike" cap="none" normalizeH="0" baseline="0" smtClean="0">
                   <a:ln>
                     <a:noFill/>
                   </a:ln>
@@ -6957,11 +6962,11 @@
                     <a:srgbClr val="000000"/>
                   </a:solidFill>
                   <a:effectLst/>
-                  <a:latin typeface="Segoe UI" panose="020B0502040204020203" pitchFamily="34" charset="0"/>
+                  <a:latin typeface="+mn-lt"/>
                 </a:rPr>
                 <a:t> </a:t>
               </a:r>
-              <a:endParaRPr kumimoji="0" lang="fr-FR" altLang="fr-FR" sz="1800" b="0" i="0" u="none" strike="noStrike" cap="none" normalizeH="0" baseline="0" smtClean="0">
+              <a:endParaRPr kumimoji="0" lang="fr-FR" altLang="fr-FR" sz="1400" b="0" i="0" u="none" strike="noStrike" cap="none" normalizeH="0" baseline="0" smtClean="0">
                 <a:ln>
                   <a:noFill/>
                 </a:ln>
@@ -6969,7 +6974,7 @@
                   <a:schemeClr val="tx1"/>
                 </a:solidFill>
                 <a:effectLst/>
-                <a:latin typeface="Arial" panose="020B0604020202020204" pitchFamily="34" charset="0"/>
+                <a:latin typeface="+mn-lt"/>
               </a:endParaRPr>
             </a:p>
           </p:txBody>
@@ -7016,7 +7021,7 @@
             </a:bodyPr>
             <a:lstStyle/>
             <a:p>
-              <a:endParaRPr lang="fr-FR"/>
+              <a:endParaRPr lang="fr-FR" sz="1400"/>
             </a:p>
           </p:txBody>
         </p:sp>
@@ -7062,7 +7067,7 @@
             </a:bodyPr>
             <a:lstStyle/>
             <a:p>
-              <a:endParaRPr lang="fr-FR"/>
+              <a:endParaRPr lang="fr-FR" sz="1400"/>
             </a:p>
           </p:txBody>
         </p:sp>
@@ -7108,7 +7113,7 @@
             </a:bodyPr>
             <a:lstStyle/>
             <a:p>
-              <a:endParaRPr lang="fr-FR"/>
+              <a:endParaRPr lang="fr-FR" sz="1400"/>
             </a:p>
           </p:txBody>
         </p:sp>
@@ -7123,7 +7128,7 @@
           <p:spPr bwMode="auto">
             <a:xfrm>
               <a:off x="1773" y="942"/>
-              <a:ext cx="65" cy="126"/>
+              <a:ext cx="25" cy="136"/>
             </a:xfrm>
             <a:prstGeom prst="rect">
               <a:avLst/>
@@ -7305,7 +7310,7 @@
                 <a:tabLst/>
               </a:pPr>
               <a:r>
-                <a:rPr kumimoji="0" lang="fr-FR" altLang="fr-FR" sz="1000" b="0" i="0" u="none" strike="noStrike" cap="none" normalizeH="0" baseline="0" smtClean="0">
+                <a:rPr kumimoji="0" lang="fr-FR" altLang="fr-FR" sz="1400" b="0" i="0" u="none" strike="noStrike" cap="none" normalizeH="0" baseline="0" smtClean="0">
                   <a:ln>
                     <a:noFill/>
                   </a:ln>
@@ -7313,11 +7318,11 @@
                     <a:srgbClr val="000000"/>
                   </a:solidFill>
                   <a:effectLst/>
-                  <a:latin typeface="Segoe UI" panose="020B0502040204020203" pitchFamily="34" charset="0"/>
+                  <a:latin typeface="+mn-lt"/>
                 </a:rPr>
                 <a:t> </a:t>
               </a:r>
-              <a:endParaRPr kumimoji="0" lang="fr-FR" altLang="fr-FR" sz="1800" b="0" i="0" u="none" strike="noStrike" cap="none" normalizeH="0" baseline="0" smtClean="0">
+              <a:endParaRPr kumimoji="0" lang="fr-FR" altLang="fr-FR" sz="1400" b="0" i="0" u="none" strike="noStrike" cap="none" normalizeH="0" baseline="0" smtClean="0">
                 <a:ln>
                   <a:noFill/>
                 </a:ln>
@@ -7325,7 +7330,7 @@
                   <a:schemeClr val="tx1"/>
                 </a:solidFill>
                 <a:effectLst/>
-                <a:latin typeface="Arial" panose="020B0604020202020204" pitchFamily="34" charset="0"/>
+                <a:latin typeface="+mn-lt"/>
               </a:endParaRPr>
             </a:p>
           </p:txBody>
@@ -7372,7 +7377,7 @@
             </a:bodyPr>
             <a:lstStyle/>
             <a:p>
-              <a:endParaRPr lang="fr-FR"/>
+              <a:endParaRPr lang="fr-FR" sz="1400"/>
             </a:p>
           </p:txBody>
         </p:sp>
@@ -7418,7 +7423,7 @@
             </a:bodyPr>
             <a:lstStyle/>
             <a:p>
-              <a:endParaRPr lang="fr-FR"/>
+              <a:endParaRPr lang="fr-FR" sz="1400"/>
             </a:p>
           </p:txBody>
         </p:sp>
@@ -7464,7 +7469,7 @@
             </a:bodyPr>
             <a:lstStyle/>
             <a:p>
-              <a:endParaRPr lang="fr-FR"/>
+              <a:endParaRPr lang="fr-FR" sz="1400"/>
             </a:p>
           </p:txBody>
         </p:sp>
@@ -7479,7 +7484,7 @@
           <p:spPr bwMode="auto">
             <a:xfrm>
               <a:off x="352" y="411"/>
-              <a:ext cx="65" cy="126"/>
+              <a:ext cx="25" cy="136"/>
             </a:xfrm>
             <a:prstGeom prst="rect">
               <a:avLst/>
@@ -7661,7 +7666,7 @@
                 <a:tabLst/>
               </a:pPr>
               <a:r>
-                <a:rPr kumimoji="0" lang="fr-FR" altLang="fr-FR" sz="1000" b="0" i="0" u="none" strike="noStrike" cap="none" normalizeH="0" baseline="0" smtClean="0">
+                <a:rPr kumimoji="0" lang="fr-FR" altLang="fr-FR" sz="1400" b="0" i="0" u="none" strike="noStrike" cap="none" normalizeH="0" baseline="0" smtClean="0">
                   <a:ln>
                     <a:noFill/>
                   </a:ln>
@@ -7669,11 +7674,11 @@
                     <a:srgbClr val="000000"/>
                   </a:solidFill>
                   <a:effectLst/>
-                  <a:latin typeface="Segoe UI" panose="020B0502040204020203" pitchFamily="34" charset="0"/>
+                  <a:latin typeface="+mn-lt"/>
                 </a:rPr>
                 <a:t> </a:t>
               </a:r>
-              <a:endParaRPr kumimoji="0" lang="fr-FR" altLang="fr-FR" sz="1800" b="0" i="0" u="none" strike="noStrike" cap="none" normalizeH="0" baseline="0" smtClean="0">
+              <a:endParaRPr kumimoji="0" lang="fr-FR" altLang="fr-FR" sz="1400" b="0" i="0" u="none" strike="noStrike" cap="none" normalizeH="0" baseline="0" smtClean="0">
                 <a:ln>
                   <a:noFill/>
                 </a:ln>
@@ -7681,7 +7686,7 @@
                   <a:schemeClr val="tx1"/>
                 </a:solidFill>
                 <a:effectLst/>
-                <a:latin typeface="Arial" panose="020B0604020202020204" pitchFamily="34" charset="0"/>
+                <a:latin typeface="+mn-lt"/>
               </a:endParaRPr>
             </a:p>
           </p:txBody>
@@ -7728,7 +7733,7 @@
             </a:bodyPr>
             <a:lstStyle/>
             <a:p>
-              <a:endParaRPr lang="fr-FR"/>
+              <a:endParaRPr lang="fr-FR" sz="1400"/>
             </a:p>
           </p:txBody>
         </p:sp>
@@ -7774,7 +7779,7 @@
             </a:bodyPr>
             <a:lstStyle/>
             <a:p>
-              <a:endParaRPr lang="fr-FR"/>
+              <a:endParaRPr lang="fr-FR" sz="1400"/>
             </a:p>
           </p:txBody>
         </p:sp>
@@ -7820,7 +7825,7 @@
             </a:bodyPr>
             <a:lstStyle/>
             <a:p>
-              <a:endParaRPr lang="fr-FR"/>
+              <a:endParaRPr lang="fr-FR" sz="1400"/>
             </a:p>
           </p:txBody>
         </p:sp>
@@ -7835,7 +7840,7 @@
           <p:spPr bwMode="auto">
             <a:xfrm>
               <a:off x="1331" y="379"/>
-              <a:ext cx="65" cy="126"/>
+              <a:ext cx="25" cy="136"/>
             </a:xfrm>
             <a:prstGeom prst="rect">
               <a:avLst/>
@@ -8017,7 +8022,7 @@
                 <a:tabLst/>
               </a:pPr>
               <a:r>
-                <a:rPr kumimoji="0" lang="fr-FR" altLang="fr-FR" sz="1000" b="0" i="0" u="none" strike="noStrike" cap="none" normalizeH="0" baseline="0" smtClean="0">
+                <a:rPr kumimoji="0" lang="fr-FR" altLang="fr-FR" sz="1400" b="0" i="0" u="none" strike="noStrike" cap="none" normalizeH="0" baseline="0" smtClean="0">
                   <a:ln>
                     <a:noFill/>
                   </a:ln>
@@ -8025,11 +8030,11 @@
                     <a:srgbClr val="000000"/>
                   </a:solidFill>
                   <a:effectLst/>
-                  <a:latin typeface="Segoe UI" panose="020B0502040204020203" pitchFamily="34" charset="0"/>
+                  <a:latin typeface="+mn-lt"/>
                 </a:rPr>
                 <a:t> </a:t>
               </a:r>
-              <a:endParaRPr kumimoji="0" lang="fr-FR" altLang="fr-FR" sz="1800" b="0" i="0" u="none" strike="noStrike" cap="none" normalizeH="0" baseline="0" smtClean="0">
+              <a:endParaRPr kumimoji="0" lang="fr-FR" altLang="fr-FR" sz="1400" b="0" i="0" u="none" strike="noStrike" cap="none" normalizeH="0" baseline="0" smtClean="0">
                 <a:ln>
                   <a:noFill/>
                 </a:ln>
@@ -8037,7 +8042,7 @@
                   <a:schemeClr val="tx1"/>
                 </a:solidFill>
                 <a:effectLst/>
-                <a:latin typeface="Arial" panose="020B0604020202020204" pitchFamily="34" charset="0"/>
+                <a:latin typeface="+mn-lt"/>
               </a:endParaRPr>
             </a:p>
           </p:txBody>
@@ -8084,7 +8089,7 @@
             </a:bodyPr>
             <a:lstStyle/>
             <a:p>
-              <a:endParaRPr lang="fr-FR"/>
+              <a:endParaRPr lang="fr-FR" sz="1400"/>
             </a:p>
           </p:txBody>
         </p:sp>
@@ -8130,7 +8135,7 @@
             </a:bodyPr>
             <a:lstStyle/>
             <a:p>
-              <a:endParaRPr lang="fr-FR"/>
+              <a:endParaRPr lang="fr-FR" sz="1400"/>
             </a:p>
           </p:txBody>
         </p:sp>
@@ -8176,7 +8181,7 @@
             </a:bodyPr>
             <a:lstStyle/>
             <a:p>
-              <a:endParaRPr lang="fr-FR"/>
+              <a:endParaRPr lang="fr-FR" sz="1400"/>
             </a:p>
           </p:txBody>
         </p:sp>
@@ -8191,7 +8196,7 @@
           <p:spPr bwMode="auto">
             <a:xfrm>
               <a:off x="2394" y="673"/>
-              <a:ext cx="65" cy="126"/>
+              <a:ext cx="25" cy="136"/>
             </a:xfrm>
             <a:prstGeom prst="rect">
               <a:avLst/>
@@ -8373,7 +8378,7 @@
                 <a:tabLst/>
               </a:pPr>
               <a:r>
-                <a:rPr kumimoji="0" lang="fr-FR" altLang="fr-FR" sz="1000" b="0" i="0" u="none" strike="noStrike" cap="none" normalizeH="0" baseline="0" smtClean="0">
+                <a:rPr kumimoji="0" lang="fr-FR" altLang="fr-FR" sz="1400" b="0" i="0" u="none" strike="noStrike" cap="none" normalizeH="0" baseline="0" smtClean="0">
                   <a:ln>
                     <a:noFill/>
                   </a:ln>
@@ -8381,11 +8386,11 @@
                     <a:srgbClr val="000000"/>
                   </a:solidFill>
                   <a:effectLst/>
-                  <a:latin typeface="Segoe UI" panose="020B0502040204020203" pitchFamily="34" charset="0"/>
+                  <a:latin typeface="+mn-lt"/>
                 </a:rPr>
                 <a:t> </a:t>
               </a:r>
-              <a:endParaRPr kumimoji="0" lang="fr-FR" altLang="fr-FR" sz="1800" b="0" i="0" u="none" strike="noStrike" cap="none" normalizeH="0" baseline="0" smtClean="0">
+              <a:endParaRPr kumimoji="0" lang="fr-FR" altLang="fr-FR" sz="1400" b="0" i="0" u="none" strike="noStrike" cap="none" normalizeH="0" baseline="0" smtClean="0">
                 <a:ln>
                   <a:noFill/>
                 </a:ln>
@@ -8393,7 +8398,7 @@
                   <a:schemeClr val="tx1"/>
                 </a:solidFill>
                 <a:effectLst/>
-                <a:latin typeface="Arial" panose="020B0604020202020204" pitchFamily="34" charset="0"/>
+                <a:latin typeface="+mn-lt"/>
               </a:endParaRPr>
             </a:p>
           </p:txBody>
@@ -8440,7 +8445,7 @@
             </a:bodyPr>
             <a:lstStyle/>
             <a:p>
-              <a:endParaRPr lang="fr-FR"/>
+              <a:endParaRPr lang="fr-FR" sz="1400"/>
             </a:p>
           </p:txBody>
         </p:sp>
@@ -8486,7 +8491,7 @@
             </a:bodyPr>
             <a:lstStyle/>
             <a:p>
-              <a:endParaRPr lang="fr-FR"/>
+              <a:endParaRPr lang="fr-FR" sz="1400"/>
             </a:p>
           </p:txBody>
         </p:sp>
@@ -8532,7 +8537,7 @@
             </a:bodyPr>
             <a:lstStyle/>
             <a:p>
-              <a:endParaRPr lang="fr-FR"/>
+              <a:endParaRPr lang="fr-FR" sz="1400"/>
             </a:p>
           </p:txBody>
         </p:sp>
@@ -8547,7 +8552,7 @@
           <p:spPr bwMode="auto">
             <a:xfrm>
               <a:off x="1773" y="942"/>
-              <a:ext cx="65" cy="126"/>
+              <a:ext cx="25" cy="136"/>
             </a:xfrm>
             <a:prstGeom prst="rect">
               <a:avLst/>
@@ -8729,7 +8734,7 @@
                 <a:tabLst/>
               </a:pPr>
               <a:r>
-                <a:rPr kumimoji="0" lang="fr-FR" altLang="fr-FR" sz="1000" b="0" i="0" u="none" strike="noStrike" cap="none" normalizeH="0" baseline="0" smtClean="0">
+                <a:rPr kumimoji="0" lang="fr-FR" altLang="fr-FR" sz="1400" b="0" i="0" u="none" strike="noStrike" cap="none" normalizeH="0" baseline="0" smtClean="0">
                   <a:ln>
                     <a:noFill/>
                   </a:ln>
@@ -8737,11 +8742,11 @@
                     <a:srgbClr val="000000"/>
                   </a:solidFill>
                   <a:effectLst/>
-                  <a:latin typeface="Segoe UI" panose="020B0502040204020203" pitchFamily="34" charset="0"/>
+                  <a:latin typeface="+mn-lt"/>
                 </a:rPr>
                 <a:t> </a:t>
               </a:r>
-              <a:endParaRPr kumimoji="0" lang="fr-FR" altLang="fr-FR" sz="1800" b="0" i="0" u="none" strike="noStrike" cap="none" normalizeH="0" baseline="0" smtClean="0">
+              <a:endParaRPr kumimoji="0" lang="fr-FR" altLang="fr-FR" sz="1400" b="0" i="0" u="none" strike="noStrike" cap="none" normalizeH="0" baseline="0" smtClean="0">
                 <a:ln>
                   <a:noFill/>
                 </a:ln>
@@ -8749,7 +8754,7 @@
                   <a:schemeClr val="tx1"/>
                 </a:solidFill>
                 <a:effectLst/>
-                <a:latin typeface="Arial" panose="020B0604020202020204" pitchFamily="34" charset="0"/>
+                <a:latin typeface="+mn-lt"/>
               </a:endParaRPr>
             </a:p>
           </p:txBody>
@@ -8796,7 +8801,7 @@
             </a:bodyPr>
             <a:lstStyle/>
             <a:p>
-              <a:endParaRPr lang="fr-FR"/>
+              <a:endParaRPr lang="fr-FR" sz="1400"/>
             </a:p>
           </p:txBody>
         </p:sp>
@@ -8842,7 +8847,7 @@
             </a:bodyPr>
             <a:lstStyle/>
             <a:p>
-              <a:endParaRPr lang="fr-FR"/>
+              <a:endParaRPr lang="fr-FR" sz="1400"/>
             </a:p>
           </p:txBody>
         </p:sp>
@@ -8888,7 +8893,7 @@
             </a:bodyPr>
             <a:lstStyle/>
             <a:p>
-              <a:endParaRPr lang="fr-FR"/>
+              <a:endParaRPr lang="fr-FR" sz="1400"/>
             </a:p>
           </p:txBody>
         </p:sp>
@@ -8903,7 +8908,7 @@
           <p:spPr bwMode="auto">
             <a:xfrm>
               <a:off x="762" y="661"/>
-              <a:ext cx="65" cy="126"/>
+              <a:ext cx="25" cy="136"/>
             </a:xfrm>
             <a:prstGeom prst="rect">
               <a:avLst/>
@@ -9085,7 +9090,7 @@
                 <a:tabLst/>
               </a:pPr>
               <a:r>
-                <a:rPr kumimoji="0" lang="fr-FR" altLang="fr-FR" sz="1000" b="0" i="0" u="none" strike="noStrike" cap="none" normalizeH="0" baseline="0" smtClean="0">
+                <a:rPr kumimoji="0" lang="fr-FR" altLang="fr-FR" sz="1400" b="0" i="0" u="none" strike="noStrike" cap="none" normalizeH="0" baseline="0" smtClean="0">
                   <a:ln>
                     <a:noFill/>
                   </a:ln>
@@ -9093,11 +9098,11 @@
                     <a:srgbClr val="000000"/>
                   </a:solidFill>
                   <a:effectLst/>
-                  <a:latin typeface="Segoe UI" panose="020B0502040204020203" pitchFamily="34" charset="0"/>
+                  <a:latin typeface="+mn-lt"/>
                 </a:rPr>
                 <a:t> </a:t>
               </a:r>
-              <a:endParaRPr kumimoji="0" lang="fr-FR" altLang="fr-FR" sz="1800" b="0" i="0" u="none" strike="noStrike" cap="none" normalizeH="0" baseline="0" smtClean="0">
+              <a:endParaRPr kumimoji="0" lang="fr-FR" altLang="fr-FR" sz="1400" b="0" i="0" u="none" strike="noStrike" cap="none" normalizeH="0" baseline="0" smtClean="0">
                 <a:ln>
                   <a:noFill/>
                 </a:ln>
@@ -9105,7 +9110,7 @@
                   <a:schemeClr val="tx1"/>
                 </a:solidFill>
                 <a:effectLst/>
-                <a:latin typeface="Arial" panose="020B0604020202020204" pitchFamily="34" charset="0"/>
+                <a:latin typeface="+mn-lt"/>
               </a:endParaRPr>
             </a:p>
           </p:txBody>
@@ -9152,7 +9157,7 @@
             </a:bodyPr>
             <a:lstStyle/>
             <a:p>
-              <a:endParaRPr lang="fr-FR"/>
+              <a:endParaRPr lang="fr-FR" sz="1400"/>
             </a:p>
           </p:txBody>
         </p:sp>
@@ -9198,7 +9203,7 @@
             </a:bodyPr>
             <a:lstStyle/>
             <a:p>
-              <a:endParaRPr lang="fr-FR"/>
+              <a:endParaRPr lang="fr-FR" sz="1400"/>
             </a:p>
           </p:txBody>
         </p:sp>
@@ -9247,7 +9252,7 @@
           <a:lstStyle/>
           <a:p>
             <a:pPr algn="ctr"/>
-            <a:endParaRPr lang="fr-FR"/>
+            <a:endParaRPr lang="fr-FR" sz="1400"/>
           </a:p>
         </p:txBody>
       </p:sp>
@@ -9315,7 +9320,7 @@
             </a:bodyPr>
             <a:lstStyle/>
             <a:p>
-              <a:endParaRPr lang="fr-FR"/>
+              <a:endParaRPr lang="fr-FR" sz="1400"/>
             </a:p>
           </p:txBody>
         </p:sp>
@@ -9362,7 +9367,7 @@
             </a:bodyPr>
             <a:lstStyle/>
             <a:p>
-              <a:endParaRPr lang="fr-FR"/>
+              <a:endParaRPr lang="fr-FR" sz="1400"/>
             </a:p>
           </p:txBody>
         </p:sp>
@@ -9376,8 +9381,8 @@
           </p:nvSpPr>
           <p:spPr bwMode="auto">
             <a:xfrm>
-              <a:off x="3634" y="194"/>
-              <a:ext cx="917" cy="126"/>
+              <a:off x="3626" y="186"/>
+              <a:ext cx="1141" cy="136"/>
             </a:xfrm>
             <a:prstGeom prst="rect">
               <a:avLst/>
@@ -9559,7 +9564,7 @@
                 <a:tabLst/>
               </a:pPr>
               <a:r>
-                <a:rPr kumimoji="0" lang="fr-FR" altLang="fr-FR" sz="1000" b="0" i="0" u="none" strike="noStrike" cap="none" normalizeH="0" baseline="0" smtClean="0">
+                <a:rPr kumimoji="0" lang="fr-FR" altLang="fr-FR" sz="1400" b="0" i="0" u="none" strike="noStrike" cap="none" normalizeH="0" baseline="0" smtClean="0">
                   <a:ln>
                     <a:noFill/>
                   </a:ln>
@@ -9567,11 +9572,11 @@
                     <a:srgbClr val="000000"/>
                   </a:solidFill>
                   <a:effectLst/>
-                  <a:latin typeface="Segoe UI" panose="020B0502040204020203" pitchFamily="34" charset="0"/>
+                  <a:latin typeface="+mn-lt"/>
                 </a:rPr>
                 <a:t>TrafficLightStateMachine</a:t>
               </a:r>
-              <a:endParaRPr kumimoji="0" lang="fr-FR" altLang="fr-FR" sz="1800" b="0" i="0" u="none" strike="noStrike" cap="none" normalizeH="0" baseline="0" smtClean="0">
+              <a:endParaRPr kumimoji="0" lang="fr-FR" altLang="fr-FR" sz="1400" b="0" i="0" u="none" strike="noStrike" cap="none" normalizeH="0" baseline="0" smtClean="0">
                 <a:ln>
                   <a:noFill/>
                 </a:ln>
@@ -9579,7 +9584,7 @@
                   <a:schemeClr val="tx1"/>
                 </a:solidFill>
                 <a:effectLst/>
-                <a:latin typeface="Arial" panose="020B0604020202020204" pitchFamily="34" charset="0"/>
+                <a:latin typeface="+mn-lt"/>
               </a:endParaRPr>
             </a:p>
           </p:txBody>
@@ -9627,7 +9632,7 @@
             </a:bodyPr>
             <a:lstStyle/>
             <a:p>
-              <a:endParaRPr lang="fr-FR"/>
+              <a:endParaRPr lang="fr-FR" sz="1400"/>
             </a:p>
           </p:txBody>
         </p:sp>
@@ -9642,7 +9647,7 @@
           <p:spPr bwMode="auto">
             <a:xfrm>
               <a:off x="3276" y="520"/>
-              <a:ext cx="299" cy="126"/>
+              <a:ext cx="342" cy="136"/>
             </a:xfrm>
             <a:prstGeom prst="rect">
               <a:avLst/>
@@ -9824,7 +9829,7 @@
                 <a:tabLst/>
               </a:pPr>
               <a:r>
-                <a:rPr kumimoji="0" lang="fr-FR" altLang="fr-FR" sz="1000" b="0" i="0" u="none" strike="noStrike" cap="none" normalizeH="0" baseline="0" smtClean="0">
+                <a:rPr kumimoji="0" lang="fr-FR" altLang="fr-FR" sz="1400" b="0" i="0" u="none" strike="noStrike" cap="none" normalizeH="0" baseline="0" smtClean="0">
                   <a:ln>
                     <a:noFill/>
                   </a:ln>
@@ -9832,11 +9837,11 @@
                     <a:srgbClr val="000000"/>
                   </a:solidFill>
                   <a:effectLst/>
-                  <a:latin typeface="Segoe UI" panose="020B0502040204020203" pitchFamily="34" charset="0"/>
+                  <a:latin typeface="+mn-lt"/>
                 </a:rPr>
                 <a:t> Initial1</a:t>
               </a:r>
-              <a:endParaRPr kumimoji="0" lang="fr-FR" altLang="fr-FR" sz="1800" b="0" i="0" u="none" strike="noStrike" cap="none" normalizeH="0" baseline="0" smtClean="0">
+              <a:endParaRPr kumimoji="0" lang="fr-FR" altLang="fr-FR" sz="1400" b="0" i="0" u="none" strike="noStrike" cap="none" normalizeH="0" baseline="0" smtClean="0">
                 <a:ln>
                   <a:noFill/>
                 </a:ln>
@@ -9844,7 +9849,7 @@
                   <a:schemeClr val="tx1"/>
                 </a:solidFill>
                 <a:effectLst/>
-                <a:latin typeface="Arial" panose="020B0604020202020204" pitchFamily="34" charset="0"/>
+                <a:latin typeface="+mn-lt"/>
               </a:endParaRPr>
             </a:p>
           </p:txBody>
@@ -9892,7 +9897,7 @@
             </a:bodyPr>
             <a:lstStyle/>
             <a:p>
-              <a:endParaRPr lang="fr-FR"/>
+              <a:endParaRPr lang="fr-FR" sz="1400"/>
             </a:p>
           </p:txBody>
         </p:sp>
@@ -9907,7 +9912,7 @@
           <p:spPr bwMode="auto">
             <a:xfrm>
               <a:off x="3628" y="360"/>
-              <a:ext cx="180" cy="126"/>
+              <a:ext cx="176" cy="136"/>
             </a:xfrm>
             <a:prstGeom prst="rect">
               <a:avLst/>
@@ -10089,7 +10094,7 @@
                 <a:tabLst/>
               </a:pPr>
               <a:r>
-                <a:rPr kumimoji="0" lang="fr-FR" altLang="fr-FR" sz="1000" b="0" i="0" u="none" strike="noStrike" cap="none" normalizeH="0" baseline="0" smtClean="0">
+                <a:rPr kumimoji="0" lang="fr-FR" altLang="fr-FR" sz="1400" b="0" i="0" u="none" strike="noStrike" cap="none" normalizeH="0" baseline="0" smtClean="0">
                   <a:ln>
                     <a:noFill/>
                   </a:ln>
@@ -10097,11 +10102,11 @@
                     <a:srgbClr val="000000"/>
                   </a:solidFill>
                   <a:effectLst/>
-                  <a:latin typeface="Segoe UI" panose="020B0502040204020203" pitchFamily="34" charset="0"/>
+                  <a:latin typeface="+mn-lt"/>
                 </a:rPr>
                 <a:t>Red</a:t>
               </a:r>
-              <a:endParaRPr kumimoji="0" lang="fr-FR" altLang="fr-FR" sz="1800" b="0" i="0" u="none" strike="noStrike" cap="none" normalizeH="0" baseline="0" smtClean="0">
+              <a:endParaRPr kumimoji="0" lang="fr-FR" altLang="fr-FR" sz="1400" b="0" i="0" u="none" strike="noStrike" cap="none" normalizeH="0" baseline="0" smtClean="0">
                 <a:ln>
                   <a:noFill/>
                 </a:ln>
@@ -10109,7 +10114,7 @@
                   <a:schemeClr val="tx1"/>
                 </a:solidFill>
                 <a:effectLst/>
-                <a:latin typeface="Arial" panose="020B0604020202020204" pitchFamily="34" charset="0"/>
+                <a:latin typeface="+mn-lt"/>
               </a:endParaRPr>
             </a:p>
           </p:txBody>
@@ -10249,7 +10254,7 @@
             </a:bodyPr>
             <a:lstStyle/>
             <a:p>
-              <a:endParaRPr lang="fr-FR"/>
+              <a:endParaRPr lang="fr-FR" sz="1400"/>
             </a:p>
           </p:txBody>
         </p:sp>
@@ -10296,7 +10301,7 @@
             </a:bodyPr>
             <a:lstStyle/>
             <a:p>
-              <a:endParaRPr lang="fr-FR"/>
+              <a:endParaRPr lang="fr-FR" sz="1400"/>
             </a:p>
           </p:txBody>
         </p:sp>
@@ -10310,8 +10315,8 @@
           </p:nvSpPr>
           <p:spPr bwMode="auto">
             <a:xfrm>
-              <a:off x="3525" y="840"/>
-              <a:ext cx="442" cy="126"/>
+              <a:off x="3378" y="848"/>
+              <a:ext cx="529" cy="136"/>
             </a:xfrm>
             <a:prstGeom prst="rect">
               <a:avLst/>
@@ -10493,7 +10498,7 @@
                 <a:tabLst/>
               </a:pPr>
               <a:r>
-                <a:rPr kumimoji="0" lang="fr-FR" altLang="fr-FR" sz="1000" b="0" i="0" u="none" strike="noStrike" cap="none" normalizeH="0" baseline="0" smtClean="0">
+                <a:rPr kumimoji="0" lang="fr-FR" altLang="fr-FR" sz="1400" b="0" i="0" u="none" strike="noStrike" cap="none" normalizeH="0" baseline="0" smtClean="0">
                   <a:ln>
                     <a:noFill/>
                   </a:ln>
@@ -10501,11 +10506,11 @@
                     <a:srgbClr val="000000"/>
                   </a:solidFill>
                   <a:effectLst/>
-                  <a:latin typeface="Segoe UI" panose="020B0502040204020203" pitchFamily="34" charset="0"/>
+                  <a:latin typeface="+mn-lt"/>
                 </a:rPr>
                 <a:t>Red_Yellow</a:t>
               </a:r>
-              <a:endParaRPr kumimoji="0" lang="fr-FR" altLang="fr-FR" sz="1800" b="0" i="0" u="none" strike="noStrike" cap="none" normalizeH="0" baseline="0" smtClean="0">
+              <a:endParaRPr kumimoji="0" lang="fr-FR" altLang="fr-FR" sz="1400" b="0" i="0" u="none" strike="noStrike" cap="none" normalizeH="0" baseline="0" smtClean="0">
                 <a:ln>
                   <a:noFill/>
                 </a:ln>
@@ -10513,7 +10518,7 @@
                   <a:schemeClr val="tx1"/>
                 </a:solidFill>
                 <a:effectLst/>
-                <a:latin typeface="Arial" panose="020B0604020202020204" pitchFamily="34" charset="0"/>
+                <a:latin typeface="+mn-lt"/>
               </a:endParaRPr>
             </a:p>
           </p:txBody>
@@ -10528,8 +10533,8 @@
           </p:nvSpPr>
           <p:spPr bwMode="auto">
             <a:xfrm>
-              <a:off x="3513" y="819"/>
-              <a:ext cx="390" cy="186"/>
+              <a:off x="3373" y="819"/>
+              <a:ext cx="530" cy="186"/>
             </a:xfrm>
             <a:custGeom>
               <a:avLst/>
@@ -10653,7 +10658,7 @@
             </a:bodyPr>
             <a:lstStyle/>
             <a:p>
-              <a:endParaRPr lang="fr-FR"/>
+              <a:endParaRPr lang="fr-FR" sz="1400"/>
             </a:p>
           </p:txBody>
         </p:sp>
@@ -10668,7 +10673,7 @@
           <p:spPr bwMode="auto">
             <a:xfrm>
               <a:off x="4454" y="333"/>
-              <a:ext cx="256" cy="237"/>
+              <a:ext cx="313" cy="237"/>
             </a:xfrm>
             <a:prstGeom prst="rect">
               <a:avLst/>
@@ -10700,7 +10705,7 @@
             </a:bodyPr>
             <a:lstStyle/>
             <a:p>
-              <a:endParaRPr lang="fr-FR"/>
+              <a:endParaRPr lang="fr-FR" sz="1400"/>
             </a:p>
           </p:txBody>
         </p:sp>
@@ -10715,7 +10720,7 @@
           <p:spPr bwMode="auto">
             <a:xfrm>
               <a:off x="4473" y="353"/>
-              <a:ext cx="272" cy="126"/>
+              <a:ext cx="296" cy="136"/>
             </a:xfrm>
             <a:prstGeom prst="rect">
               <a:avLst/>
@@ -10897,7 +10902,7 @@
                 <a:tabLst/>
               </a:pPr>
               <a:r>
-                <a:rPr kumimoji="0" lang="fr-FR" altLang="fr-FR" sz="1000" b="0" i="0" u="none" strike="noStrike" cap="none" normalizeH="0" baseline="0" smtClean="0">
+                <a:rPr kumimoji="0" lang="fr-FR" altLang="fr-FR" sz="1400" b="0" i="0" u="none" strike="noStrike" cap="none" normalizeH="0" baseline="0" smtClean="0">
                   <a:ln>
                     <a:noFill/>
                   </a:ln>
@@ -10905,11 +10910,11 @@
                     <a:srgbClr val="000000"/>
                   </a:solidFill>
                   <a:effectLst/>
-                  <a:latin typeface="Segoe UI" panose="020B0502040204020203" pitchFamily="34" charset="0"/>
+                  <a:latin typeface="+mn-lt"/>
                 </a:rPr>
                 <a:t>Yellow</a:t>
               </a:r>
-              <a:endParaRPr kumimoji="0" lang="fr-FR" altLang="fr-FR" sz="1800" b="0" i="0" u="none" strike="noStrike" cap="none" normalizeH="0" baseline="0" smtClean="0">
+              <a:endParaRPr kumimoji="0" lang="fr-FR" altLang="fr-FR" sz="1400" b="0" i="0" u="none" strike="noStrike" cap="none" normalizeH="0" baseline="0" smtClean="0">
                 <a:ln>
                   <a:noFill/>
                 </a:ln>
@@ -10917,7 +10922,7 @@
                   <a:schemeClr val="tx1"/>
                 </a:solidFill>
                 <a:effectLst/>
-                <a:latin typeface="Arial" panose="020B0604020202020204" pitchFamily="34" charset="0"/>
+                <a:latin typeface="+mn-lt"/>
               </a:endParaRPr>
             </a:p>
           </p:txBody>
@@ -10933,7 +10938,7 @@
           <p:spPr bwMode="auto">
             <a:xfrm>
               <a:off x="4454" y="333"/>
-              <a:ext cx="250" cy="231"/>
+              <a:ext cx="313" cy="231"/>
             </a:xfrm>
             <a:custGeom>
               <a:avLst/>
@@ -11057,7 +11062,7 @@
             </a:bodyPr>
             <a:lstStyle/>
             <a:p>
-              <a:endParaRPr lang="fr-FR"/>
+              <a:endParaRPr lang="fr-FR" sz="1400"/>
             </a:p>
           </p:txBody>
         </p:sp>
@@ -11104,7 +11109,7 @@
             </a:bodyPr>
             <a:lstStyle/>
             <a:p>
-              <a:endParaRPr lang="fr-FR"/>
+              <a:endParaRPr lang="fr-FR" sz="1400"/>
             </a:p>
           </p:txBody>
         </p:sp>
@@ -11119,7 +11124,7 @@
           <p:spPr bwMode="auto">
             <a:xfrm>
               <a:off x="4492" y="821"/>
-              <a:ext cx="255" cy="126"/>
+              <a:ext cx="282" cy="136"/>
             </a:xfrm>
             <a:prstGeom prst="rect">
               <a:avLst/>
@@ -11301,7 +11306,7 @@
                 <a:tabLst/>
               </a:pPr>
               <a:r>
-                <a:rPr kumimoji="0" lang="fr-FR" altLang="fr-FR" sz="1000" b="0" i="0" u="none" strike="noStrike" cap="none" normalizeH="0" baseline="0" smtClean="0">
+                <a:rPr kumimoji="0" lang="fr-FR" altLang="fr-FR" sz="1400" b="0" i="0" u="none" strike="noStrike" cap="none" normalizeH="0" baseline="0" smtClean="0">
                   <a:ln>
                     <a:noFill/>
                   </a:ln>
@@ -11309,11 +11314,11 @@
                     <a:srgbClr val="000000"/>
                   </a:solidFill>
                   <a:effectLst/>
-                  <a:latin typeface="Segoe UI" panose="020B0502040204020203" pitchFamily="34" charset="0"/>
+                  <a:latin typeface="+mn-lt"/>
                 </a:rPr>
                 <a:t>Green</a:t>
               </a:r>
-              <a:endParaRPr kumimoji="0" lang="fr-FR" altLang="fr-FR" sz="1800" b="0" i="0" u="none" strike="noStrike" cap="none" normalizeH="0" baseline="0" smtClean="0">
+              <a:endParaRPr kumimoji="0" lang="fr-FR" altLang="fr-FR" sz="1400" b="0" i="0" u="none" strike="noStrike" cap="none" normalizeH="0" baseline="0" smtClean="0">
                 <a:ln>
                   <a:noFill/>
                 </a:ln>
@@ -11321,7 +11326,7 @@
                   <a:schemeClr val="tx1"/>
                 </a:solidFill>
                 <a:effectLst/>
-                <a:latin typeface="Arial" panose="020B0604020202020204" pitchFamily="34" charset="0"/>
+                <a:latin typeface="+mn-lt"/>
               </a:endParaRPr>
             </a:p>
           </p:txBody>
@@ -11337,7 +11342,7 @@
           <p:spPr bwMode="auto">
             <a:xfrm>
               <a:off x="4460" y="800"/>
-              <a:ext cx="250" cy="231"/>
+              <a:ext cx="385" cy="231"/>
             </a:xfrm>
             <a:custGeom>
               <a:avLst/>
@@ -11461,7 +11466,7 @@
             </a:bodyPr>
             <a:lstStyle/>
             <a:p>
-              <a:endParaRPr lang="fr-FR"/>
+              <a:endParaRPr lang="fr-FR" sz="1400"/>
             </a:p>
           </p:txBody>
         </p:sp>
@@ -11507,7 +11512,7 @@
             </a:bodyPr>
             <a:lstStyle/>
             <a:p>
-              <a:endParaRPr lang="fr-FR"/>
+              <a:endParaRPr lang="fr-FR" sz="1400"/>
             </a:p>
           </p:txBody>
         </p:sp>
@@ -11646,7 +11651,7 @@
             </a:bodyPr>
             <a:lstStyle/>
             <a:p>
-              <a:endParaRPr lang="fr-FR"/>
+              <a:endParaRPr lang="fr-FR" sz="1400"/>
             </a:p>
           </p:txBody>
         </p:sp>
@@ -11692,225 +11697,7 @@
             </a:bodyPr>
             <a:lstStyle/>
             <a:p>
-              <a:endParaRPr lang="fr-FR"/>
-            </a:p>
-          </p:txBody>
-        </p:sp>
-        <p:sp>
-          <p:nvSpPr>
-            <p:cNvPr id="98" name="Rectangle 95"/>
-            <p:cNvSpPr>
-              <a:spLocks noChangeArrowheads="1"/>
-            </p:cNvSpPr>
-            <p:nvPr/>
-          </p:nvSpPr>
-          <p:spPr bwMode="auto">
-            <a:xfrm>
-              <a:off x="3737" y="609"/>
-              <a:ext cx="547" cy="126"/>
-            </a:xfrm>
-            <a:prstGeom prst="rect">
-              <a:avLst/>
-            </a:prstGeom>
-            <a:noFill/>
-            <a:ln>
-              <a:noFill/>
-            </a:ln>
-            <a:extLst>
-              <a:ext uri="{909E8E84-426E-40DD-AFC4-6F175D3DCCD1}">
-                <a14:hiddenFill xmlns:a14="http://schemas.microsoft.com/office/drawing/2010/main">
-                  <a:solidFill>
-                    <a:srgbClr val="FFFFFF"/>
-                  </a:solidFill>
-                </a14:hiddenFill>
-              </a:ext>
-              <a:ext uri="{91240B29-F687-4F45-9708-019B960494DF}">
-                <a14:hiddenLine xmlns:a14="http://schemas.microsoft.com/office/drawing/2010/main" w="9525">
-                  <a:solidFill>
-                    <a:srgbClr val="000000"/>
-                  </a:solidFill>
-                  <a:miter lim="800000"/>
-                  <a:headEnd/>
-                  <a:tailEnd/>
-                </a14:hiddenLine>
-              </a:ext>
-            </a:extLst>
-          </p:spPr>
-          <p:txBody>
-            <a:bodyPr vert="horz" wrap="none" lIns="0" tIns="0" rIns="0" bIns="0" numCol="1" anchor="t" anchorCtr="0" compatLnSpc="1">
-              <a:prstTxWarp prst="textNoShape">
-                <a:avLst/>
-              </a:prstTxWarp>
-              <a:spAutoFit/>
-            </a:bodyPr>
-            <a:lstStyle>
-              <a:lvl1pPr eaLnBrk="0" fontAlgn="base" hangingPunct="0">
-                <a:spcBef>
-                  <a:spcPct val="0"/>
-                </a:spcBef>
-                <a:spcAft>
-                  <a:spcPct val="0"/>
-                </a:spcAft>
-                <a:defRPr>
-                  <a:solidFill>
-                    <a:schemeClr val="tx1"/>
-                  </a:solidFill>
-                  <a:latin typeface="Arial" panose="020B0604020202020204" pitchFamily="34" charset="0"/>
-                </a:defRPr>
-              </a:lvl1pPr>
-              <a:lvl2pPr eaLnBrk="0" fontAlgn="base" hangingPunct="0">
-                <a:spcBef>
-                  <a:spcPct val="0"/>
-                </a:spcBef>
-                <a:spcAft>
-                  <a:spcPct val="0"/>
-                </a:spcAft>
-                <a:defRPr>
-                  <a:solidFill>
-                    <a:schemeClr val="tx1"/>
-                  </a:solidFill>
-                  <a:latin typeface="Arial" panose="020B0604020202020204" pitchFamily="34" charset="0"/>
-                </a:defRPr>
-              </a:lvl2pPr>
-              <a:lvl3pPr eaLnBrk="0" fontAlgn="base" hangingPunct="0">
-                <a:spcBef>
-                  <a:spcPct val="0"/>
-                </a:spcBef>
-                <a:spcAft>
-                  <a:spcPct val="0"/>
-                </a:spcAft>
-                <a:defRPr>
-                  <a:solidFill>
-                    <a:schemeClr val="tx1"/>
-                  </a:solidFill>
-                  <a:latin typeface="Arial" panose="020B0604020202020204" pitchFamily="34" charset="0"/>
-                </a:defRPr>
-              </a:lvl3pPr>
-              <a:lvl4pPr eaLnBrk="0" fontAlgn="base" hangingPunct="0">
-                <a:spcBef>
-                  <a:spcPct val="0"/>
-                </a:spcBef>
-                <a:spcAft>
-                  <a:spcPct val="0"/>
-                </a:spcAft>
-                <a:defRPr>
-                  <a:solidFill>
-                    <a:schemeClr val="tx1"/>
-                  </a:solidFill>
-                  <a:latin typeface="Arial" panose="020B0604020202020204" pitchFamily="34" charset="0"/>
-                </a:defRPr>
-              </a:lvl4pPr>
-              <a:lvl5pPr eaLnBrk="0" fontAlgn="base" hangingPunct="0">
-                <a:spcBef>
-                  <a:spcPct val="0"/>
-                </a:spcBef>
-                <a:spcAft>
-                  <a:spcPct val="0"/>
-                </a:spcAft>
-                <a:defRPr>
-                  <a:solidFill>
-                    <a:schemeClr val="tx1"/>
-                  </a:solidFill>
-                  <a:latin typeface="Arial" panose="020B0604020202020204" pitchFamily="34" charset="0"/>
-                </a:defRPr>
-              </a:lvl5pPr>
-              <a:lvl6pPr eaLnBrk="0" fontAlgn="base" hangingPunct="0">
-                <a:spcBef>
-                  <a:spcPct val="0"/>
-                </a:spcBef>
-                <a:spcAft>
-                  <a:spcPct val="0"/>
-                </a:spcAft>
-                <a:defRPr>
-                  <a:solidFill>
-                    <a:schemeClr val="tx1"/>
-                  </a:solidFill>
-                  <a:latin typeface="Arial" panose="020B0604020202020204" pitchFamily="34" charset="0"/>
-                </a:defRPr>
-              </a:lvl6pPr>
-              <a:lvl7pPr eaLnBrk="0" fontAlgn="base" hangingPunct="0">
-                <a:spcBef>
-                  <a:spcPct val="0"/>
-                </a:spcBef>
-                <a:spcAft>
-                  <a:spcPct val="0"/>
-                </a:spcAft>
-                <a:defRPr>
-                  <a:solidFill>
-                    <a:schemeClr val="tx1"/>
-                  </a:solidFill>
-                  <a:latin typeface="Arial" panose="020B0604020202020204" pitchFamily="34" charset="0"/>
-                </a:defRPr>
-              </a:lvl7pPr>
-              <a:lvl8pPr eaLnBrk="0" fontAlgn="base" hangingPunct="0">
-                <a:spcBef>
-                  <a:spcPct val="0"/>
-                </a:spcBef>
-                <a:spcAft>
-                  <a:spcPct val="0"/>
-                </a:spcAft>
-                <a:defRPr>
-                  <a:solidFill>
-                    <a:schemeClr val="tx1"/>
-                  </a:solidFill>
-                  <a:latin typeface="Arial" panose="020B0604020202020204" pitchFamily="34" charset="0"/>
-                </a:defRPr>
-              </a:lvl8pPr>
-              <a:lvl9pPr eaLnBrk="0" fontAlgn="base" hangingPunct="0">
-                <a:spcBef>
-                  <a:spcPct val="0"/>
-                </a:spcBef>
-                <a:spcAft>
-                  <a:spcPct val="0"/>
-                </a:spcAft>
-                <a:defRPr>
-                  <a:solidFill>
-                    <a:schemeClr val="tx1"/>
-                  </a:solidFill>
-                  <a:latin typeface="Arial" panose="020B0604020202020204" pitchFamily="34" charset="0"/>
-                </a:defRPr>
-              </a:lvl9pPr>
-            </a:lstStyle>
-            <a:p>
-              <a:pPr marL="0" marR="0" lvl="0" indent="0" algn="l" defTabSz="914400" rtl="0" eaLnBrk="0" fontAlgn="base" latinLnBrk="0" hangingPunct="0">
-                <a:lnSpc>
-                  <a:spcPct val="100000"/>
-                </a:lnSpc>
-                <a:spcBef>
-                  <a:spcPct val="0"/>
-                </a:spcBef>
-                <a:spcAft>
-                  <a:spcPct val="0"/>
-                </a:spcAft>
-                <a:buClrTx/>
-                <a:buSzTx/>
-                <a:buFontTx/>
-                <a:buNone/>
-                <a:tabLst/>
-              </a:pPr>
-              <a:r>
-                <a:rPr kumimoji="0" lang="fr-FR" altLang="fr-FR" sz="1000" b="0" i="0" u="none" strike="noStrike" cap="none" normalizeH="0" baseline="0" smtClean="0">
-                  <a:ln>
-                    <a:noFill/>
-                  </a:ln>
-                  <a:solidFill>
-                    <a:srgbClr val="000000"/>
-                  </a:solidFill>
-                  <a:effectLst/>
-                  <a:latin typeface="Segoe UI" panose="020B0502040204020203" pitchFamily="34" charset="0"/>
-                </a:rPr>
-                <a:t>OnRed_Yellow</a:t>
-              </a:r>
-              <a:endParaRPr kumimoji="0" lang="fr-FR" altLang="fr-FR" sz="1800" b="0" i="0" u="none" strike="noStrike" cap="none" normalizeH="0" baseline="0" smtClean="0">
-                <a:ln>
-                  <a:noFill/>
-                </a:ln>
-                <a:solidFill>
-                  <a:schemeClr val="tx1"/>
-                </a:solidFill>
-                <a:effectLst/>
-                <a:latin typeface="Arial" panose="020B0604020202020204" pitchFamily="34" charset="0"/>
-              </a:endParaRPr>
+              <a:endParaRPr lang="fr-FR" sz="1400"/>
             </a:p>
           </p:txBody>
         </p:sp>
@@ -11956,7 +11743,7 @@
             </a:bodyPr>
             <a:lstStyle/>
             <a:p>
-              <a:endParaRPr lang="fr-FR"/>
+              <a:endParaRPr lang="fr-FR" sz="1400"/>
             </a:p>
           </p:txBody>
         </p:sp>
@@ -12002,7 +11789,7 @@
             </a:bodyPr>
             <a:lstStyle/>
             <a:p>
-              <a:endParaRPr lang="fr-FR"/>
+              <a:endParaRPr lang="fr-FR" sz="1400"/>
             </a:p>
           </p:txBody>
         </p:sp>
@@ -12048,225 +11835,7 @@
             </a:bodyPr>
             <a:lstStyle/>
             <a:p>
-              <a:endParaRPr lang="fr-FR"/>
-            </a:p>
-          </p:txBody>
-        </p:sp>
-        <p:sp>
-          <p:nvSpPr>
-            <p:cNvPr id="102" name="Rectangle 99"/>
-            <p:cNvSpPr>
-              <a:spLocks noChangeArrowheads="1"/>
-            </p:cNvSpPr>
-            <p:nvPr/>
-          </p:nvSpPr>
-          <p:spPr bwMode="auto">
-            <a:xfrm>
-              <a:off x="4114" y="366"/>
-              <a:ext cx="285" cy="126"/>
-            </a:xfrm>
-            <a:prstGeom prst="rect">
-              <a:avLst/>
-            </a:prstGeom>
-            <a:noFill/>
-            <a:ln>
-              <a:noFill/>
-            </a:ln>
-            <a:extLst>
-              <a:ext uri="{909E8E84-426E-40DD-AFC4-6F175D3DCCD1}">
-                <a14:hiddenFill xmlns:a14="http://schemas.microsoft.com/office/drawing/2010/main">
-                  <a:solidFill>
-                    <a:srgbClr val="FFFFFF"/>
-                  </a:solidFill>
-                </a14:hiddenFill>
-              </a:ext>
-              <a:ext uri="{91240B29-F687-4F45-9708-019B960494DF}">
-                <a14:hiddenLine xmlns:a14="http://schemas.microsoft.com/office/drawing/2010/main" w="9525">
-                  <a:solidFill>
-                    <a:srgbClr val="000000"/>
-                  </a:solidFill>
-                  <a:miter lim="800000"/>
-                  <a:headEnd/>
-                  <a:tailEnd/>
-                </a14:hiddenLine>
-              </a:ext>
-            </a:extLst>
-          </p:spPr>
-          <p:txBody>
-            <a:bodyPr vert="horz" wrap="none" lIns="0" tIns="0" rIns="0" bIns="0" numCol="1" anchor="t" anchorCtr="0" compatLnSpc="1">
-              <a:prstTxWarp prst="textNoShape">
-                <a:avLst/>
-              </a:prstTxWarp>
-              <a:spAutoFit/>
-            </a:bodyPr>
-            <a:lstStyle>
-              <a:lvl1pPr eaLnBrk="0" fontAlgn="base" hangingPunct="0">
-                <a:spcBef>
-                  <a:spcPct val="0"/>
-                </a:spcBef>
-                <a:spcAft>
-                  <a:spcPct val="0"/>
-                </a:spcAft>
-                <a:defRPr>
-                  <a:solidFill>
-                    <a:schemeClr val="tx1"/>
-                  </a:solidFill>
-                  <a:latin typeface="Arial" panose="020B0604020202020204" pitchFamily="34" charset="0"/>
-                </a:defRPr>
-              </a:lvl1pPr>
-              <a:lvl2pPr eaLnBrk="0" fontAlgn="base" hangingPunct="0">
-                <a:spcBef>
-                  <a:spcPct val="0"/>
-                </a:spcBef>
-                <a:spcAft>
-                  <a:spcPct val="0"/>
-                </a:spcAft>
-                <a:defRPr>
-                  <a:solidFill>
-                    <a:schemeClr val="tx1"/>
-                  </a:solidFill>
-                  <a:latin typeface="Arial" panose="020B0604020202020204" pitchFamily="34" charset="0"/>
-                </a:defRPr>
-              </a:lvl2pPr>
-              <a:lvl3pPr eaLnBrk="0" fontAlgn="base" hangingPunct="0">
-                <a:spcBef>
-                  <a:spcPct val="0"/>
-                </a:spcBef>
-                <a:spcAft>
-                  <a:spcPct val="0"/>
-                </a:spcAft>
-                <a:defRPr>
-                  <a:solidFill>
-                    <a:schemeClr val="tx1"/>
-                  </a:solidFill>
-                  <a:latin typeface="Arial" panose="020B0604020202020204" pitchFamily="34" charset="0"/>
-                </a:defRPr>
-              </a:lvl3pPr>
-              <a:lvl4pPr eaLnBrk="0" fontAlgn="base" hangingPunct="0">
-                <a:spcBef>
-                  <a:spcPct val="0"/>
-                </a:spcBef>
-                <a:spcAft>
-                  <a:spcPct val="0"/>
-                </a:spcAft>
-                <a:defRPr>
-                  <a:solidFill>
-                    <a:schemeClr val="tx1"/>
-                  </a:solidFill>
-                  <a:latin typeface="Arial" panose="020B0604020202020204" pitchFamily="34" charset="0"/>
-                </a:defRPr>
-              </a:lvl4pPr>
-              <a:lvl5pPr eaLnBrk="0" fontAlgn="base" hangingPunct="0">
-                <a:spcBef>
-                  <a:spcPct val="0"/>
-                </a:spcBef>
-                <a:spcAft>
-                  <a:spcPct val="0"/>
-                </a:spcAft>
-                <a:defRPr>
-                  <a:solidFill>
-                    <a:schemeClr val="tx1"/>
-                  </a:solidFill>
-                  <a:latin typeface="Arial" panose="020B0604020202020204" pitchFamily="34" charset="0"/>
-                </a:defRPr>
-              </a:lvl5pPr>
-              <a:lvl6pPr eaLnBrk="0" fontAlgn="base" hangingPunct="0">
-                <a:spcBef>
-                  <a:spcPct val="0"/>
-                </a:spcBef>
-                <a:spcAft>
-                  <a:spcPct val="0"/>
-                </a:spcAft>
-                <a:defRPr>
-                  <a:solidFill>
-                    <a:schemeClr val="tx1"/>
-                  </a:solidFill>
-                  <a:latin typeface="Arial" panose="020B0604020202020204" pitchFamily="34" charset="0"/>
-                </a:defRPr>
-              </a:lvl6pPr>
-              <a:lvl7pPr eaLnBrk="0" fontAlgn="base" hangingPunct="0">
-                <a:spcBef>
-                  <a:spcPct val="0"/>
-                </a:spcBef>
-                <a:spcAft>
-                  <a:spcPct val="0"/>
-                </a:spcAft>
-                <a:defRPr>
-                  <a:solidFill>
-                    <a:schemeClr val="tx1"/>
-                  </a:solidFill>
-                  <a:latin typeface="Arial" panose="020B0604020202020204" pitchFamily="34" charset="0"/>
-                </a:defRPr>
-              </a:lvl7pPr>
-              <a:lvl8pPr eaLnBrk="0" fontAlgn="base" hangingPunct="0">
-                <a:spcBef>
-                  <a:spcPct val="0"/>
-                </a:spcBef>
-                <a:spcAft>
-                  <a:spcPct val="0"/>
-                </a:spcAft>
-                <a:defRPr>
-                  <a:solidFill>
-                    <a:schemeClr val="tx1"/>
-                  </a:solidFill>
-                  <a:latin typeface="Arial" panose="020B0604020202020204" pitchFamily="34" charset="0"/>
-                </a:defRPr>
-              </a:lvl8pPr>
-              <a:lvl9pPr eaLnBrk="0" fontAlgn="base" hangingPunct="0">
-                <a:spcBef>
-                  <a:spcPct val="0"/>
-                </a:spcBef>
-                <a:spcAft>
-                  <a:spcPct val="0"/>
-                </a:spcAft>
-                <a:defRPr>
-                  <a:solidFill>
-                    <a:schemeClr val="tx1"/>
-                  </a:solidFill>
-                  <a:latin typeface="Arial" panose="020B0604020202020204" pitchFamily="34" charset="0"/>
-                </a:defRPr>
-              </a:lvl9pPr>
-            </a:lstStyle>
-            <a:p>
-              <a:pPr marL="0" marR="0" lvl="0" indent="0" algn="l" defTabSz="914400" rtl="0" eaLnBrk="0" fontAlgn="base" latinLnBrk="0" hangingPunct="0">
-                <a:lnSpc>
-                  <a:spcPct val="100000"/>
-                </a:lnSpc>
-                <a:spcBef>
-                  <a:spcPct val="0"/>
-                </a:spcBef>
-                <a:spcAft>
-                  <a:spcPct val="0"/>
-                </a:spcAft>
-                <a:buClrTx/>
-                <a:buSzTx/>
-                <a:buFontTx/>
-                <a:buNone/>
-                <a:tabLst/>
-              </a:pPr>
-              <a:r>
-                <a:rPr kumimoji="0" lang="fr-FR" altLang="fr-FR" sz="1000" b="0" i="0" u="none" strike="noStrike" cap="none" normalizeH="0" baseline="0" smtClean="0">
-                  <a:ln>
-                    <a:noFill/>
-                  </a:ln>
-                  <a:solidFill>
-                    <a:srgbClr val="000000"/>
-                  </a:solidFill>
-                  <a:effectLst/>
-                  <a:latin typeface="Segoe UI" panose="020B0502040204020203" pitchFamily="34" charset="0"/>
-                </a:rPr>
-                <a:t>OnRed</a:t>
-              </a:r>
-              <a:endParaRPr kumimoji="0" lang="fr-FR" altLang="fr-FR" sz="1800" b="0" i="0" u="none" strike="noStrike" cap="none" normalizeH="0" baseline="0" smtClean="0">
-                <a:ln>
-                  <a:noFill/>
-                </a:ln>
-                <a:solidFill>
-                  <a:schemeClr val="tx1"/>
-                </a:solidFill>
-                <a:effectLst/>
-                <a:latin typeface="Arial" panose="020B0604020202020204" pitchFamily="34" charset="0"/>
-              </a:endParaRPr>
+              <a:endParaRPr lang="fr-FR" sz="1400"/>
             </a:p>
           </p:txBody>
         </p:sp>
@@ -12312,7 +11881,7 @@
             </a:bodyPr>
             <a:lstStyle/>
             <a:p>
-              <a:endParaRPr lang="fr-FR"/>
+              <a:endParaRPr lang="fr-FR" sz="1400"/>
             </a:p>
           </p:txBody>
         </p:sp>
@@ -12358,7 +11927,7 @@
             </a:bodyPr>
             <a:lstStyle/>
             <a:p>
-              <a:endParaRPr lang="fr-FR"/>
+              <a:endParaRPr lang="fr-FR" sz="1400"/>
             </a:p>
           </p:txBody>
         </p:sp>
@@ -12404,225 +11973,7 @@
             </a:bodyPr>
             <a:lstStyle/>
             <a:p>
-              <a:endParaRPr lang="fr-FR"/>
-            </a:p>
-          </p:txBody>
-        </p:sp>
-        <p:sp>
-          <p:nvSpPr>
-            <p:cNvPr id="106" name="Rectangle 103"/>
-            <p:cNvSpPr>
-              <a:spLocks noChangeArrowheads="1"/>
-            </p:cNvSpPr>
-            <p:nvPr/>
-          </p:nvSpPr>
-          <p:spPr bwMode="auto">
-            <a:xfrm>
-              <a:off x="4614" y="654"/>
-              <a:ext cx="377" cy="126"/>
-            </a:xfrm>
-            <a:prstGeom prst="rect">
-              <a:avLst/>
-            </a:prstGeom>
-            <a:noFill/>
-            <a:ln>
-              <a:noFill/>
-            </a:ln>
-            <a:extLst>
-              <a:ext uri="{909E8E84-426E-40DD-AFC4-6F175D3DCCD1}">
-                <a14:hiddenFill xmlns:a14="http://schemas.microsoft.com/office/drawing/2010/main">
-                  <a:solidFill>
-                    <a:srgbClr val="FFFFFF"/>
-                  </a:solidFill>
-                </a14:hiddenFill>
-              </a:ext>
-              <a:ext uri="{91240B29-F687-4F45-9708-019B960494DF}">
-                <a14:hiddenLine xmlns:a14="http://schemas.microsoft.com/office/drawing/2010/main" w="9525">
-                  <a:solidFill>
-                    <a:srgbClr val="000000"/>
-                  </a:solidFill>
-                  <a:miter lim="800000"/>
-                  <a:headEnd/>
-                  <a:tailEnd/>
-                </a14:hiddenLine>
-              </a:ext>
-            </a:extLst>
-          </p:spPr>
-          <p:txBody>
-            <a:bodyPr vert="horz" wrap="none" lIns="0" tIns="0" rIns="0" bIns="0" numCol="1" anchor="t" anchorCtr="0" compatLnSpc="1">
-              <a:prstTxWarp prst="textNoShape">
-                <a:avLst/>
-              </a:prstTxWarp>
-              <a:spAutoFit/>
-            </a:bodyPr>
-            <a:lstStyle>
-              <a:lvl1pPr eaLnBrk="0" fontAlgn="base" hangingPunct="0">
-                <a:spcBef>
-                  <a:spcPct val="0"/>
-                </a:spcBef>
-                <a:spcAft>
-                  <a:spcPct val="0"/>
-                </a:spcAft>
-                <a:defRPr>
-                  <a:solidFill>
-                    <a:schemeClr val="tx1"/>
-                  </a:solidFill>
-                  <a:latin typeface="Arial" panose="020B0604020202020204" pitchFamily="34" charset="0"/>
-                </a:defRPr>
-              </a:lvl1pPr>
-              <a:lvl2pPr eaLnBrk="0" fontAlgn="base" hangingPunct="0">
-                <a:spcBef>
-                  <a:spcPct val="0"/>
-                </a:spcBef>
-                <a:spcAft>
-                  <a:spcPct val="0"/>
-                </a:spcAft>
-                <a:defRPr>
-                  <a:solidFill>
-                    <a:schemeClr val="tx1"/>
-                  </a:solidFill>
-                  <a:latin typeface="Arial" panose="020B0604020202020204" pitchFamily="34" charset="0"/>
-                </a:defRPr>
-              </a:lvl2pPr>
-              <a:lvl3pPr eaLnBrk="0" fontAlgn="base" hangingPunct="0">
-                <a:spcBef>
-                  <a:spcPct val="0"/>
-                </a:spcBef>
-                <a:spcAft>
-                  <a:spcPct val="0"/>
-                </a:spcAft>
-                <a:defRPr>
-                  <a:solidFill>
-                    <a:schemeClr val="tx1"/>
-                  </a:solidFill>
-                  <a:latin typeface="Arial" panose="020B0604020202020204" pitchFamily="34" charset="0"/>
-                </a:defRPr>
-              </a:lvl3pPr>
-              <a:lvl4pPr eaLnBrk="0" fontAlgn="base" hangingPunct="0">
-                <a:spcBef>
-                  <a:spcPct val="0"/>
-                </a:spcBef>
-                <a:spcAft>
-                  <a:spcPct val="0"/>
-                </a:spcAft>
-                <a:defRPr>
-                  <a:solidFill>
-                    <a:schemeClr val="tx1"/>
-                  </a:solidFill>
-                  <a:latin typeface="Arial" panose="020B0604020202020204" pitchFamily="34" charset="0"/>
-                </a:defRPr>
-              </a:lvl4pPr>
-              <a:lvl5pPr eaLnBrk="0" fontAlgn="base" hangingPunct="0">
-                <a:spcBef>
-                  <a:spcPct val="0"/>
-                </a:spcBef>
-                <a:spcAft>
-                  <a:spcPct val="0"/>
-                </a:spcAft>
-                <a:defRPr>
-                  <a:solidFill>
-                    <a:schemeClr val="tx1"/>
-                  </a:solidFill>
-                  <a:latin typeface="Arial" panose="020B0604020202020204" pitchFamily="34" charset="0"/>
-                </a:defRPr>
-              </a:lvl5pPr>
-              <a:lvl6pPr eaLnBrk="0" fontAlgn="base" hangingPunct="0">
-                <a:spcBef>
-                  <a:spcPct val="0"/>
-                </a:spcBef>
-                <a:spcAft>
-                  <a:spcPct val="0"/>
-                </a:spcAft>
-                <a:defRPr>
-                  <a:solidFill>
-                    <a:schemeClr val="tx1"/>
-                  </a:solidFill>
-                  <a:latin typeface="Arial" panose="020B0604020202020204" pitchFamily="34" charset="0"/>
-                </a:defRPr>
-              </a:lvl6pPr>
-              <a:lvl7pPr eaLnBrk="0" fontAlgn="base" hangingPunct="0">
-                <a:spcBef>
-                  <a:spcPct val="0"/>
-                </a:spcBef>
-                <a:spcAft>
-                  <a:spcPct val="0"/>
-                </a:spcAft>
-                <a:defRPr>
-                  <a:solidFill>
-                    <a:schemeClr val="tx1"/>
-                  </a:solidFill>
-                  <a:latin typeface="Arial" panose="020B0604020202020204" pitchFamily="34" charset="0"/>
-                </a:defRPr>
-              </a:lvl7pPr>
-              <a:lvl8pPr eaLnBrk="0" fontAlgn="base" hangingPunct="0">
-                <a:spcBef>
-                  <a:spcPct val="0"/>
-                </a:spcBef>
-                <a:spcAft>
-                  <a:spcPct val="0"/>
-                </a:spcAft>
-                <a:defRPr>
-                  <a:solidFill>
-                    <a:schemeClr val="tx1"/>
-                  </a:solidFill>
-                  <a:latin typeface="Arial" panose="020B0604020202020204" pitchFamily="34" charset="0"/>
-                </a:defRPr>
-              </a:lvl8pPr>
-              <a:lvl9pPr eaLnBrk="0" fontAlgn="base" hangingPunct="0">
-                <a:spcBef>
-                  <a:spcPct val="0"/>
-                </a:spcBef>
-                <a:spcAft>
-                  <a:spcPct val="0"/>
-                </a:spcAft>
-                <a:defRPr>
-                  <a:solidFill>
-                    <a:schemeClr val="tx1"/>
-                  </a:solidFill>
-                  <a:latin typeface="Arial" panose="020B0604020202020204" pitchFamily="34" charset="0"/>
-                </a:defRPr>
-              </a:lvl9pPr>
-            </a:lstStyle>
-            <a:p>
-              <a:pPr marL="0" marR="0" lvl="0" indent="0" algn="l" defTabSz="914400" rtl="0" eaLnBrk="0" fontAlgn="base" latinLnBrk="0" hangingPunct="0">
-                <a:lnSpc>
-                  <a:spcPct val="100000"/>
-                </a:lnSpc>
-                <a:spcBef>
-                  <a:spcPct val="0"/>
-                </a:spcBef>
-                <a:spcAft>
-                  <a:spcPct val="0"/>
-                </a:spcAft>
-                <a:buClrTx/>
-                <a:buSzTx/>
-                <a:buFontTx/>
-                <a:buNone/>
-                <a:tabLst/>
-              </a:pPr>
-              <a:r>
-                <a:rPr kumimoji="0" lang="fr-FR" altLang="fr-FR" sz="1000" b="0" i="0" u="none" strike="noStrike" cap="none" normalizeH="0" baseline="0" smtClean="0">
-                  <a:ln>
-                    <a:noFill/>
-                  </a:ln>
-                  <a:solidFill>
-                    <a:srgbClr val="000000"/>
-                  </a:solidFill>
-                  <a:effectLst/>
-                  <a:latin typeface="Segoe UI" panose="020B0502040204020203" pitchFamily="34" charset="0"/>
-                </a:rPr>
-                <a:t>OnYellow</a:t>
-              </a:r>
-              <a:endParaRPr kumimoji="0" lang="fr-FR" altLang="fr-FR" sz="1800" b="0" i="0" u="none" strike="noStrike" cap="none" normalizeH="0" baseline="0" smtClean="0">
-                <a:ln>
-                  <a:noFill/>
-                </a:ln>
-                <a:solidFill>
-                  <a:schemeClr val="tx1"/>
-                </a:solidFill>
-                <a:effectLst/>
-                <a:latin typeface="Arial" panose="020B0604020202020204" pitchFamily="34" charset="0"/>
-              </a:endParaRPr>
+              <a:endParaRPr lang="fr-FR" sz="1400"/>
             </a:p>
           </p:txBody>
         </p:sp>
@@ -12668,7 +12019,7 @@
             </a:bodyPr>
             <a:lstStyle/>
             <a:p>
-              <a:endParaRPr lang="fr-FR"/>
+              <a:endParaRPr lang="fr-FR" sz="1400"/>
             </a:p>
           </p:txBody>
         </p:sp>
@@ -12714,7 +12065,7 @@
             </a:bodyPr>
             <a:lstStyle/>
             <a:p>
-              <a:endParaRPr lang="fr-FR"/>
+              <a:endParaRPr lang="fr-FR" sz="1400"/>
             </a:p>
           </p:txBody>
         </p:sp>
@@ -12760,7 +12111,7 @@
             </a:bodyPr>
             <a:lstStyle/>
             <a:p>
-              <a:endParaRPr lang="fr-FR"/>
+              <a:endParaRPr lang="fr-FR" sz="1400"/>
             </a:p>
           </p:txBody>
         </p:sp>
@@ -12775,7 +12126,7 @@
           <p:spPr bwMode="auto">
             <a:xfrm>
               <a:off x="3429" y="392"/>
-              <a:ext cx="65" cy="126"/>
+              <a:ext cx="25" cy="136"/>
             </a:xfrm>
             <a:prstGeom prst="rect">
               <a:avLst/>
@@ -12957,7 +12308,7 @@
                 <a:tabLst/>
               </a:pPr>
               <a:r>
-                <a:rPr kumimoji="0" lang="fr-FR" altLang="fr-FR" sz="1000" b="0" i="0" u="none" strike="noStrike" cap="none" normalizeH="0" baseline="0" smtClean="0">
+                <a:rPr kumimoji="0" lang="fr-FR" altLang="fr-FR" sz="1400" b="0" i="0" u="none" strike="noStrike" cap="none" normalizeH="0" baseline="0" smtClean="0">
                   <a:ln>
                     <a:noFill/>
                   </a:ln>
@@ -12965,11 +12316,11 @@
                     <a:srgbClr val="000000"/>
                   </a:solidFill>
                   <a:effectLst/>
-                  <a:latin typeface="Segoe UI" panose="020B0502040204020203" pitchFamily="34" charset="0"/>
+                  <a:latin typeface="+mn-lt"/>
                 </a:rPr>
                 <a:t> </a:t>
               </a:r>
-              <a:endParaRPr kumimoji="0" lang="fr-FR" altLang="fr-FR" sz="1800" b="0" i="0" u="none" strike="noStrike" cap="none" normalizeH="0" baseline="0" smtClean="0">
+              <a:endParaRPr kumimoji="0" lang="fr-FR" altLang="fr-FR" sz="1400" b="0" i="0" u="none" strike="noStrike" cap="none" normalizeH="0" baseline="0" smtClean="0">
                 <a:ln>
                   <a:noFill/>
                 </a:ln>
@@ -12977,7 +12328,7 @@
                   <a:schemeClr val="tx1"/>
                 </a:solidFill>
                 <a:effectLst/>
-                <a:latin typeface="Arial" panose="020B0604020202020204" pitchFamily="34" charset="0"/>
+                <a:latin typeface="+mn-lt"/>
               </a:endParaRPr>
             </a:p>
           </p:txBody>
@@ -13024,7 +12375,7 @@
             </a:bodyPr>
             <a:lstStyle/>
             <a:p>
-              <a:endParaRPr lang="fr-FR"/>
+              <a:endParaRPr lang="fr-FR" sz="1400"/>
             </a:p>
           </p:txBody>
         </p:sp>
@@ -13070,7 +12421,7 @@
             </a:bodyPr>
             <a:lstStyle/>
             <a:p>
-              <a:endParaRPr lang="fr-FR"/>
+              <a:endParaRPr lang="fr-FR" sz="1400"/>
             </a:p>
           </p:txBody>
         </p:sp>
@@ -13116,225 +12467,7 @@
             </a:bodyPr>
             <a:lstStyle/>
             <a:p>
-              <a:endParaRPr lang="fr-FR"/>
-            </a:p>
-          </p:txBody>
-        </p:sp>
-        <p:sp>
-          <p:nvSpPr>
-            <p:cNvPr id="114" name="Rectangle 111"/>
-            <p:cNvSpPr>
-              <a:spLocks noChangeArrowheads="1"/>
-            </p:cNvSpPr>
-            <p:nvPr/>
-          </p:nvSpPr>
-          <p:spPr bwMode="auto">
-            <a:xfrm>
-              <a:off x="4025" y="853"/>
-              <a:ext cx="360" cy="126"/>
-            </a:xfrm>
-            <a:prstGeom prst="rect">
-              <a:avLst/>
-            </a:prstGeom>
-            <a:noFill/>
-            <a:ln>
-              <a:noFill/>
-            </a:ln>
-            <a:extLst>
-              <a:ext uri="{909E8E84-426E-40DD-AFC4-6F175D3DCCD1}">
-                <a14:hiddenFill xmlns:a14="http://schemas.microsoft.com/office/drawing/2010/main">
-                  <a:solidFill>
-                    <a:srgbClr val="FFFFFF"/>
-                  </a:solidFill>
-                </a14:hiddenFill>
-              </a:ext>
-              <a:ext uri="{91240B29-F687-4F45-9708-019B960494DF}">
-                <a14:hiddenLine xmlns:a14="http://schemas.microsoft.com/office/drawing/2010/main" w="9525">
-                  <a:solidFill>
-                    <a:srgbClr val="000000"/>
-                  </a:solidFill>
-                  <a:miter lim="800000"/>
-                  <a:headEnd/>
-                  <a:tailEnd/>
-                </a14:hiddenLine>
-              </a:ext>
-            </a:extLst>
-          </p:spPr>
-          <p:txBody>
-            <a:bodyPr vert="horz" wrap="none" lIns="0" tIns="0" rIns="0" bIns="0" numCol="1" anchor="t" anchorCtr="0" compatLnSpc="1">
-              <a:prstTxWarp prst="textNoShape">
-                <a:avLst/>
-              </a:prstTxWarp>
-              <a:spAutoFit/>
-            </a:bodyPr>
-            <a:lstStyle>
-              <a:lvl1pPr eaLnBrk="0" fontAlgn="base" hangingPunct="0">
-                <a:spcBef>
-                  <a:spcPct val="0"/>
-                </a:spcBef>
-                <a:spcAft>
-                  <a:spcPct val="0"/>
-                </a:spcAft>
-                <a:defRPr>
-                  <a:solidFill>
-                    <a:schemeClr val="tx1"/>
-                  </a:solidFill>
-                  <a:latin typeface="Arial" panose="020B0604020202020204" pitchFamily="34" charset="0"/>
-                </a:defRPr>
-              </a:lvl1pPr>
-              <a:lvl2pPr eaLnBrk="0" fontAlgn="base" hangingPunct="0">
-                <a:spcBef>
-                  <a:spcPct val="0"/>
-                </a:spcBef>
-                <a:spcAft>
-                  <a:spcPct val="0"/>
-                </a:spcAft>
-                <a:defRPr>
-                  <a:solidFill>
-                    <a:schemeClr val="tx1"/>
-                  </a:solidFill>
-                  <a:latin typeface="Arial" panose="020B0604020202020204" pitchFamily="34" charset="0"/>
-                </a:defRPr>
-              </a:lvl2pPr>
-              <a:lvl3pPr eaLnBrk="0" fontAlgn="base" hangingPunct="0">
-                <a:spcBef>
-                  <a:spcPct val="0"/>
-                </a:spcBef>
-                <a:spcAft>
-                  <a:spcPct val="0"/>
-                </a:spcAft>
-                <a:defRPr>
-                  <a:solidFill>
-                    <a:schemeClr val="tx1"/>
-                  </a:solidFill>
-                  <a:latin typeface="Arial" panose="020B0604020202020204" pitchFamily="34" charset="0"/>
-                </a:defRPr>
-              </a:lvl3pPr>
-              <a:lvl4pPr eaLnBrk="0" fontAlgn="base" hangingPunct="0">
-                <a:spcBef>
-                  <a:spcPct val="0"/>
-                </a:spcBef>
-                <a:spcAft>
-                  <a:spcPct val="0"/>
-                </a:spcAft>
-                <a:defRPr>
-                  <a:solidFill>
-                    <a:schemeClr val="tx1"/>
-                  </a:solidFill>
-                  <a:latin typeface="Arial" panose="020B0604020202020204" pitchFamily="34" charset="0"/>
-                </a:defRPr>
-              </a:lvl4pPr>
-              <a:lvl5pPr eaLnBrk="0" fontAlgn="base" hangingPunct="0">
-                <a:spcBef>
-                  <a:spcPct val="0"/>
-                </a:spcBef>
-                <a:spcAft>
-                  <a:spcPct val="0"/>
-                </a:spcAft>
-                <a:defRPr>
-                  <a:solidFill>
-                    <a:schemeClr val="tx1"/>
-                  </a:solidFill>
-                  <a:latin typeface="Arial" panose="020B0604020202020204" pitchFamily="34" charset="0"/>
-                </a:defRPr>
-              </a:lvl5pPr>
-              <a:lvl6pPr eaLnBrk="0" fontAlgn="base" hangingPunct="0">
-                <a:spcBef>
-                  <a:spcPct val="0"/>
-                </a:spcBef>
-                <a:spcAft>
-                  <a:spcPct val="0"/>
-                </a:spcAft>
-                <a:defRPr>
-                  <a:solidFill>
-                    <a:schemeClr val="tx1"/>
-                  </a:solidFill>
-                  <a:latin typeface="Arial" panose="020B0604020202020204" pitchFamily="34" charset="0"/>
-                </a:defRPr>
-              </a:lvl6pPr>
-              <a:lvl7pPr eaLnBrk="0" fontAlgn="base" hangingPunct="0">
-                <a:spcBef>
-                  <a:spcPct val="0"/>
-                </a:spcBef>
-                <a:spcAft>
-                  <a:spcPct val="0"/>
-                </a:spcAft>
-                <a:defRPr>
-                  <a:solidFill>
-                    <a:schemeClr val="tx1"/>
-                  </a:solidFill>
-                  <a:latin typeface="Arial" panose="020B0604020202020204" pitchFamily="34" charset="0"/>
-                </a:defRPr>
-              </a:lvl7pPr>
-              <a:lvl8pPr eaLnBrk="0" fontAlgn="base" hangingPunct="0">
-                <a:spcBef>
-                  <a:spcPct val="0"/>
-                </a:spcBef>
-                <a:spcAft>
-                  <a:spcPct val="0"/>
-                </a:spcAft>
-                <a:defRPr>
-                  <a:solidFill>
-                    <a:schemeClr val="tx1"/>
-                  </a:solidFill>
-                  <a:latin typeface="Arial" panose="020B0604020202020204" pitchFamily="34" charset="0"/>
-                </a:defRPr>
-              </a:lvl8pPr>
-              <a:lvl9pPr eaLnBrk="0" fontAlgn="base" hangingPunct="0">
-                <a:spcBef>
-                  <a:spcPct val="0"/>
-                </a:spcBef>
-                <a:spcAft>
-                  <a:spcPct val="0"/>
-                </a:spcAft>
-                <a:defRPr>
-                  <a:solidFill>
-                    <a:schemeClr val="tx1"/>
-                  </a:solidFill>
-                  <a:latin typeface="Arial" panose="020B0604020202020204" pitchFamily="34" charset="0"/>
-                </a:defRPr>
-              </a:lvl9pPr>
-            </a:lstStyle>
-            <a:p>
-              <a:pPr marL="0" marR="0" lvl="0" indent="0" algn="l" defTabSz="914400" rtl="0" eaLnBrk="0" fontAlgn="base" latinLnBrk="0" hangingPunct="0">
-                <a:lnSpc>
-                  <a:spcPct val="100000"/>
-                </a:lnSpc>
-                <a:spcBef>
-                  <a:spcPct val="0"/>
-                </a:spcBef>
-                <a:spcAft>
-                  <a:spcPct val="0"/>
-                </a:spcAft>
-                <a:buClrTx/>
-                <a:buSzTx/>
-                <a:buFontTx/>
-                <a:buNone/>
-                <a:tabLst/>
-              </a:pPr>
-              <a:r>
-                <a:rPr kumimoji="0" lang="fr-FR" altLang="fr-FR" sz="1000" b="0" i="0" u="none" strike="noStrike" cap="none" normalizeH="0" baseline="0" smtClean="0">
-                  <a:ln>
-                    <a:noFill/>
-                  </a:ln>
-                  <a:solidFill>
-                    <a:srgbClr val="000000"/>
-                  </a:solidFill>
-                  <a:effectLst/>
-                  <a:latin typeface="Segoe UI" panose="020B0502040204020203" pitchFamily="34" charset="0"/>
-                </a:rPr>
-                <a:t>OnGreen</a:t>
-              </a:r>
-              <a:endParaRPr kumimoji="0" lang="fr-FR" altLang="fr-FR" sz="1800" b="0" i="0" u="none" strike="noStrike" cap="none" normalizeH="0" baseline="0" smtClean="0">
-                <a:ln>
-                  <a:noFill/>
-                </a:ln>
-                <a:solidFill>
-                  <a:schemeClr val="tx1"/>
-                </a:solidFill>
-                <a:effectLst/>
-                <a:latin typeface="Arial" panose="020B0604020202020204" pitchFamily="34" charset="0"/>
-              </a:endParaRPr>
+              <a:endParaRPr lang="fr-FR" sz="1400"/>
             </a:p>
           </p:txBody>
         </p:sp>
@@ -13380,7 +12513,7 @@
             </a:bodyPr>
             <a:lstStyle/>
             <a:p>
-              <a:endParaRPr lang="fr-FR"/>
+              <a:endParaRPr lang="fr-FR" sz="1400"/>
             </a:p>
           </p:txBody>
         </p:sp>
@@ -13426,7 +12559,7 @@
             </a:bodyPr>
             <a:lstStyle/>
             <a:p>
-              <a:endParaRPr lang="fr-FR"/>
+              <a:endParaRPr lang="fr-FR" sz="1400"/>
             </a:p>
           </p:txBody>
         </p:sp>
@@ -13472,7 +12605,7 @@
             </a:bodyPr>
             <a:lstStyle/>
             <a:p>
-              <a:endParaRPr lang="fr-FR"/>
+              <a:endParaRPr lang="fr-FR" sz="1400"/>
             </a:p>
           </p:txBody>
         </p:sp>
@@ -13487,7 +12620,7 @@
           <p:spPr bwMode="auto">
             <a:xfrm>
               <a:off x="3429" y="392"/>
-              <a:ext cx="65" cy="126"/>
+              <a:ext cx="25" cy="136"/>
             </a:xfrm>
             <a:prstGeom prst="rect">
               <a:avLst/>
@@ -13669,7 +12802,7 @@
                 <a:tabLst/>
               </a:pPr>
               <a:r>
-                <a:rPr kumimoji="0" lang="fr-FR" altLang="fr-FR" sz="1000" b="0" i="0" u="none" strike="noStrike" cap="none" normalizeH="0" baseline="0" smtClean="0">
+                <a:rPr kumimoji="0" lang="fr-FR" altLang="fr-FR" sz="1400" b="0" i="0" u="none" strike="noStrike" cap="none" normalizeH="0" baseline="0" smtClean="0">
                   <a:ln>
                     <a:noFill/>
                   </a:ln>
@@ -13677,11 +12810,11 @@
                     <a:srgbClr val="000000"/>
                   </a:solidFill>
                   <a:effectLst/>
-                  <a:latin typeface="Segoe UI" panose="020B0502040204020203" pitchFamily="34" charset="0"/>
+                  <a:latin typeface="+mn-lt"/>
                 </a:rPr>
                 <a:t> </a:t>
               </a:r>
-              <a:endParaRPr kumimoji="0" lang="fr-FR" altLang="fr-FR" sz="1800" b="0" i="0" u="none" strike="noStrike" cap="none" normalizeH="0" baseline="0" smtClean="0">
+              <a:endParaRPr kumimoji="0" lang="fr-FR" altLang="fr-FR" sz="1400" b="0" i="0" u="none" strike="noStrike" cap="none" normalizeH="0" baseline="0" smtClean="0">
                 <a:ln>
                   <a:noFill/>
                 </a:ln>
@@ -13689,7 +12822,7 @@
                   <a:schemeClr val="tx1"/>
                 </a:solidFill>
                 <a:effectLst/>
-                <a:latin typeface="Arial" panose="020B0604020202020204" pitchFamily="34" charset="0"/>
+                <a:latin typeface="+mn-lt"/>
               </a:endParaRPr>
             </a:p>
           </p:txBody>
@@ -13736,7 +12869,7 @@
             </a:bodyPr>
             <a:lstStyle/>
             <a:p>
-              <a:endParaRPr lang="fr-FR"/>
+              <a:endParaRPr lang="fr-FR" sz="1400"/>
             </a:p>
           </p:txBody>
         </p:sp>
@@ -13782,7 +12915,7 @@
             </a:bodyPr>
             <a:lstStyle/>
             <a:p>
-              <a:endParaRPr lang="fr-FR"/>
+              <a:endParaRPr lang="fr-FR" sz="1400"/>
             </a:p>
           </p:txBody>
         </p:sp>
@@ -13828,7 +12961,7 @@
             </a:bodyPr>
             <a:lstStyle/>
             <a:p>
-              <a:endParaRPr lang="fr-FR"/>
+              <a:endParaRPr lang="fr-FR" sz="1400"/>
             </a:p>
           </p:txBody>
         </p:sp>
@@ -13842,8 +12975,8 @@
           </p:nvSpPr>
           <p:spPr bwMode="auto">
             <a:xfrm>
-              <a:off x="3737" y="609"/>
-              <a:ext cx="547" cy="126"/>
+              <a:off x="3735" y="593"/>
+              <a:ext cx="663" cy="136"/>
             </a:xfrm>
             <a:prstGeom prst="rect">
               <a:avLst/>
@@ -14025,7 +13158,7 @@
                 <a:tabLst/>
               </a:pPr>
               <a:r>
-                <a:rPr kumimoji="0" lang="fr-FR" altLang="fr-FR" sz="1000" b="0" i="0" u="none" strike="noStrike" cap="none" normalizeH="0" baseline="0" smtClean="0">
+                <a:rPr kumimoji="0" lang="fr-FR" altLang="fr-FR" sz="1400" b="0" i="0" u="none" strike="noStrike" cap="none" normalizeH="0" baseline="0" smtClean="0">
                   <a:ln>
                     <a:noFill/>
                   </a:ln>
@@ -14033,11 +13166,11 @@
                     <a:srgbClr val="000000"/>
                   </a:solidFill>
                   <a:effectLst/>
-                  <a:latin typeface="Segoe UI" panose="020B0502040204020203" pitchFamily="34" charset="0"/>
+                  <a:latin typeface="+mn-lt"/>
                 </a:rPr>
                 <a:t>OnRed_Yellow</a:t>
               </a:r>
-              <a:endParaRPr kumimoji="0" lang="fr-FR" altLang="fr-FR" sz="1800" b="0" i="0" u="none" strike="noStrike" cap="none" normalizeH="0" baseline="0" smtClean="0">
+              <a:endParaRPr kumimoji="0" lang="fr-FR" altLang="fr-FR" sz="1400" b="0" i="0" u="none" strike="noStrike" cap="none" normalizeH="0" baseline="0" smtClean="0">
                 <a:ln>
                   <a:noFill/>
                 </a:ln>
@@ -14045,7 +13178,7 @@
                   <a:schemeClr val="tx1"/>
                 </a:solidFill>
                 <a:effectLst/>
-                <a:latin typeface="Arial" panose="020B0604020202020204" pitchFamily="34" charset="0"/>
+                <a:latin typeface="+mn-lt"/>
               </a:endParaRPr>
             </a:p>
           </p:txBody>
@@ -14092,7 +13225,7 @@
             </a:bodyPr>
             <a:lstStyle/>
             <a:p>
-              <a:endParaRPr lang="fr-FR"/>
+              <a:endParaRPr lang="fr-FR" sz="1400"/>
             </a:p>
           </p:txBody>
         </p:sp>
@@ -14138,7 +13271,7 @@
             </a:bodyPr>
             <a:lstStyle/>
             <a:p>
-              <a:endParaRPr lang="fr-FR"/>
+              <a:endParaRPr lang="fr-FR" sz="1400"/>
             </a:p>
           </p:txBody>
         </p:sp>
@@ -14184,7 +13317,7 @@
             </a:bodyPr>
             <a:lstStyle/>
             <a:p>
-              <a:endParaRPr lang="fr-FR"/>
+              <a:endParaRPr lang="fr-FR" sz="1400"/>
             </a:p>
           </p:txBody>
         </p:sp>
@@ -14198,8 +13331,8 @@
           </p:nvSpPr>
           <p:spPr bwMode="auto">
             <a:xfrm>
-              <a:off x="4025" y="853"/>
-              <a:ext cx="360" cy="126"/>
+              <a:off x="3979" y="818"/>
+              <a:ext cx="417" cy="136"/>
             </a:xfrm>
             <a:prstGeom prst="rect">
               <a:avLst/>
@@ -14381,7 +13514,7 @@
                 <a:tabLst/>
               </a:pPr>
               <a:r>
-                <a:rPr kumimoji="0" lang="fr-FR" altLang="fr-FR" sz="1000" b="0" i="0" u="none" strike="noStrike" cap="none" normalizeH="0" baseline="0" smtClean="0">
+                <a:rPr kumimoji="0" lang="fr-FR" altLang="fr-FR" sz="1400" b="0" i="0" u="none" strike="noStrike" cap="none" normalizeH="0" baseline="0" smtClean="0">
                   <a:ln>
                     <a:noFill/>
                   </a:ln>
@@ -14389,11 +13522,11 @@
                     <a:srgbClr val="000000"/>
                   </a:solidFill>
                   <a:effectLst/>
-                  <a:latin typeface="Segoe UI" panose="020B0502040204020203" pitchFamily="34" charset="0"/>
+                  <a:latin typeface="+mn-lt"/>
                 </a:rPr>
                 <a:t>OnGreen</a:t>
               </a:r>
-              <a:endParaRPr kumimoji="0" lang="fr-FR" altLang="fr-FR" sz="1800" b="0" i="0" u="none" strike="noStrike" cap="none" normalizeH="0" baseline="0" smtClean="0">
+              <a:endParaRPr kumimoji="0" lang="fr-FR" altLang="fr-FR" sz="1400" b="0" i="0" u="none" strike="noStrike" cap="none" normalizeH="0" baseline="0" smtClean="0">
                 <a:ln>
                   <a:noFill/>
                 </a:ln>
@@ -14401,7 +13534,7 @@
                   <a:schemeClr val="tx1"/>
                 </a:solidFill>
                 <a:effectLst/>
-                <a:latin typeface="Arial" panose="020B0604020202020204" pitchFamily="34" charset="0"/>
+                <a:latin typeface="+mn-lt"/>
               </a:endParaRPr>
             </a:p>
           </p:txBody>
@@ -14448,7 +13581,7 @@
             </a:bodyPr>
             <a:lstStyle/>
             <a:p>
-              <a:endParaRPr lang="fr-FR"/>
+              <a:endParaRPr lang="fr-FR" sz="1400"/>
             </a:p>
           </p:txBody>
         </p:sp>
@@ -14494,7 +13627,7 @@
             </a:bodyPr>
             <a:lstStyle/>
             <a:p>
-              <a:endParaRPr lang="fr-FR"/>
+              <a:endParaRPr lang="fr-FR" sz="1400"/>
             </a:p>
           </p:txBody>
         </p:sp>
@@ -14540,7 +13673,7 @@
             </a:bodyPr>
             <a:lstStyle/>
             <a:p>
-              <a:endParaRPr lang="fr-FR"/>
+              <a:endParaRPr lang="fr-FR" sz="1400"/>
             </a:p>
           </p:txBody>
         </p:sp>
@@ -14554,8 +13687,8 @@
           </p:nvSpPr>
           <p:spPr bwMode="auto">
             <a:xfrm>
-              <a:off x="4614" y="654"/>
-              <a:ext cx="377" cy="126"/>
+              <a:off x="4581" y="646"/>
+              <a:ext cx="431" cy="136"/>
             </a:xfrm>
             <a:prstGeom prst="rect">
               <a:avLst/>
@@ -14737,7 +13870,7 @@
                 <a:tabLst/>
               </a:pPr>
               <a:r>
-                <a:rPr kumimoji="0" lang="fr-FR" altLang="fr-FR" sz="1000" b="0" i="0" u="none" strike="noStrike" cap="none" normalizeH="0" baseline="0" smtClean="0">
+                <a:rPr kumimoji="0" lang="fr-FR" altLang="fr-FR" sz="1400" b="0" i="0" u="none" strike="noStrike" cap="none" normalizeH="0" baseline="0" smtClean="0">
                   <a:ln>
                     <a:noFill/>
                   </a:ln>
@@ -14745,11 +13878,11 @@
                     <a:srgbClr val="000000"/>
                   </a:solidFill>
                   <a:effectLst/>
-                  <a:latin typeface="Segoe UI" panose="020B0502040204020203" pitchFamily="34" charset="0"/>
+                  <a:latin typeface="+mn-lt"/>
                 </a:rPr>
                 <a:t>OnYellow</a:t>
               </a:r>
-              <a:endParaRPr kumimoji="0" lang="fr-FR" altLang="fr-FR" sz="1800" b="0" i="0" u="none" strike="noStrike" cap="none" normalizeH="0" baseline="0" smtClean="0">
+              <a:endParaRPr kumimoji="0" lang="fr-FR" altLang="fr-FR" sz="1400" b="0" i="0" u="none" strike="noStrike" cap="none" normalizeH="0" baseline="0" smtClean="0">
                 <a:ln>
                   <a:noFill/>
                 </a:ln>
@@ -14757,7 +13890,7 @@
                   <a:schemeClr val="tx1"/>
                 </a:solidFill>
                 <a:effectLst/>
-                <a:latin typeface="Arial" panose="020B0604020202020204" pitchFamily="34" charset="0"/>
+                <a:latin typeface="+mn-lt"/>
               </a:endParaRPr>
             </a:p>
           </p:txBody>
@@ -14804,7 +13937,7 @@
             </a:bodyPr>
             <a:lstStyle/>
             <a:p>
-              <a:endParaRPr lang="fr-FR"/>
+              <a:endParaRPr lang="fr-FR" sz="1400"/>
             </a:p>
           </p:txBody>
         </p:sp>
@@ -14850,7 +13983,7 @@
             </a:bodyPr>
             <a:lstStyle/>
             <a:p>
-              <a:endParaRPr lang="fr-FR"/>
+              <a:endParaRPr lang="fr-FR" sz="1400"/>
             </a:p>
           </p:txBody>
         </p:sp>
@@ -14896,7 +14029,7 @@
             </a:bodyPr>
             <a:lstStyle/>
             <a:p>
-              <a:endParaRPr lang="fr-FR"/>
+              <a:endParaRPr lang="fr-FR" sz="1400"/>
             </a:p>
           </p:txBody>
         </p:sp>
@@ -14910,8 +14043,8 @@
           </p:nvSpPr>
           <p:spPr bwMode="auto">
             <a:xfrm>
-              <a:off x="4114" y="366"/>
-              <a:ext cx="285" cy="126"/>
+              <a:off x="4039" y="359"/>
+              <a:ext cx="310" cy="136"/>
             </a:xfrm>
             <a:prstGeom prst="rect">
               <a:avLst/>
@@ -15093,7 +14226,7 @@
                 <a:tabLst/>
               </a:pPr>
               <a:r>
-                <a:rPr kumimoji="0" lang="fr-FR" altLang="fr-FR" sz="1000" b="0" i="0" u="none" strike="noStrike" cap="none" normalizeH="0" baseline="0" smtClean="0">
+                <a:rPr kumimoji="0" lang="fr-FR" altLang="fr-FR" sz="1400" b="0" i="0" u="none" strike="noStrike" cap="none" normalizeH="0" baseline="0" smtClean="0">
                   <a:ln>
                     <a:noFill/>
                   </a:ln>
@@ -15101,11 +14234,11 @@
                     <a:srgbClr val="000000"/>
                   </a:solidFill>
                   <a:effectLst/>
-                  <a:latin typeface="Segoe UI" panose="020B0502040204020203" pitchFamily="34" charset="0"/>
+                  <a:latin typeface="+mn-lt"/>
                 </a:rPr>
                 <a:t>OnRed</a:t>
               </a:r>
-              <a:endParaRPr kumimoji="0" lang="fr-FR" altLang="fr-FR" sz="1800" b="0" i="0" u="none" strike="noStrike" cap="none" normalizeH="0" baseline="0" smtClean="0">
+              <a:endParaRPr kumimoji="0" lang="fr-FR" altLang="fr-FR" sz="1400" b="0" i="0" u="none" strike="noStrike" cap="none" normalizeH="0" baseline="0" smtClean="0">
                 <a:ln>
                   <a:noFill/>
                 </a:ln>
@@ -15113,7 +14246,7 @@
                   <a:schemeClr val="tx1"/>
                 </a:solidFill>
                 <a:effectLst/>
-                <a:latin typeface="Arial" panose="020B0604020202020204" pitchFamily="34" charset="0"/>
+                <a:latin typeface="+mn-lt"/>
               </a:endParaRPr>
             </a:p>
           </p:txBody>
@@ -15160,7 +14293,7 @@
             </a:bodyPr>
             <a:lstStyle/>
             <a:p>
-              <a:endParaRPr lang="fr-FR"/>
+              <a:endParaRPr lang="fr-FR" sz="1400"/>
             </a:p>
           </p:txBody>
         </p:sp>
@@ -15206,7 +14339,7 @@
             </a:bodyPr>
             <a:lstStyle/>
             <a:p>
-              <a:endParaRPr lang="fr-FR"/>
+              <a:endParaRPr lang="fr-FR" sz="1400"/>
             </a:p>
           </p:txBody>
         </p:sp>
@@ -15255,7 +14388,7 @@
           <a:lstStyle/>
           <a:p>
             <a:pPr algn="ctr"/>
-            <a:endParaRPr lang="fr-FR"/>
+            <a:endParaRPr lang="fr-FR" sz="1400"/>
           </a:p>
         </p:txBody>
       </p:sp>

</xml_diff>